<commit_message>
results of meeting 24_1_22
</commit_message>
<xml_diff>
--- a/docs/presentation_slides/Final_Presentation_25_01.pptx
+++ b/docs/presentation_slides/Final_Presentation_25_01.pptx
@@ -6,7 +6,7 @@
     <p:sldMasterId id="2147483684" r:id="rId2"/>
   </p:sldMasterIdLst>
   <p:notesMasterIdLst>
-    <p:notesMasterId r:id="rId42"/>
+    <p:notesMasterId r:id="rId38"/>
   </p:notesMasterIdLst>
   <p:sldIdLst>
     <p:sldId id="273" r:id="rId3"/>
@@ -22,9 +22,9 @@
     <p:sldId id="267" r:id="rId13"/>
     <p:sldId id="258" r:id="rId14"/>
     <p:sldId id="285" r:id="rId15"/>
-    <p:sldId id="289" r:id="rId16"/>
-    <p:sldId id="284" r:id="rId17"/>
-    <p:sldId id="286" r:id="rId18"/>
+    <p:sldId id="301" r:id="rId16"/>
+    <p:sldId id="289" r:id="rId17"/>
+    <p:sldId id="284" r:id="rId18"/>
     <p:sldId id="271" r:id="rId19"/>
     <p:sldId id="298" r:id="rId20"/>
     <p:sldId id="270" r:id="rId21"/>
@@ -44,10 +44,6 @@
     <p:sldId id="274" r:id="rId35"/>
     <p:sldId id="275" r:id="rId36"/>
     <p:sldId id="257" r:id="rId37"/>
-    <p:sldId id="259" r:id="rId38"/>
-    <p:sldId id="281" r:id="rId39"/>
-    <p:sldId id="260" r:id="rId40"/>
-    <p:sldId id="264" r:id="rId41"/>
   </p:sldIdLst>
   <p:sldSz cx="12192000" cy="6858000"/>
   <p:notesSz cx="6858000" cy="9144000"/>
@@ -168,6 +164,7 @@
             <p14:sldId id="267"/>
             <p14:sldId id="258"/>
             <p14:sldId id="285"/>
+            <p14:sldId id="301"/>
           </p14:sldIdLst>
         </p14:section>
         <p14:section name="Interne Umsetzung" id="{B488E3C5-1FD4-4B69-9F3C-407012F68808}">
@@ -178,7 +175,6 @@
         </p14:section>
         <p14:section name="Business Analyse" id="{70F21393-2CC6-45F6-B52C-958DB1C22EF3}">
           <p14:sldIdLst>
-            <p14:sldId id="286"/>
             <p14:sldId id="271"/>
             <p14:sldId id="298"/>
             <p14:sldId id="270"/>
@@ -202,10 +198,6 @@
             <p14:sldId id="274"/>
             <p14:sldId id="275"/>
             <p14:sldId id="257"/>
-            <p14:sldId id="259"/>
-            <p14:sldId id="281"/>
-            <p14:sldId id="260"/>
-            <p14:sldId id="264"/>
           </p14:sldIdLst>
         </p14:section>
       </p14:sectionLst>
@@ -684,7 +676,49 @@
             </a:pPr>
             <a:r>
               <a:rPr lang="de-DE"/>
-              <a:t>Jana: Code schon ausgeführt haben</a:t>
+              <a:t>Jana: Code schon ausgeführt haben &amp; Headset</a:t>
+            </a:r>
+          </a:p>
+          <a:p>
+            <a:pPr marL="0" lvl="0" indent="0" algn="l" rtl="0">
+              <a:spcBef>
+                <a:spcPts val="0"/>
+              </a:spcBef>
+              <a:spcAft>
+                <a:spcPts val="0"/>
+              </a:spcAft>
+              <a:buNone/>
+            </a:pPr>
+            <a:endParaRPr lang="de-DE"/>
+          </a:p>
+          <a:p>
+            <a:pPr marL="0" lvl="0" indent="0" algn="l" rtl="0">
+              <a:spcBef>
+                <a:spcPts val="0"/>
+              </a:spcBef>
+              <a:spcAft>
+                <a:spcPts val="0"/>
+              </a:spcAft>
+              <a:buNone/>
+            </a:pPr>
+            <a:r>
+              <a:rPr lang="de-DE"/>
+              <a:t>1.Teil siezen</a:t>
+            </a:r>
+          </a:p>
+          <a:p>
+            <a:pPr marL="0" lvl="0" indent="0" algn="l" rtl="0">
+              <a:spcBef>
+                <a:spcPts val="0"/>
+              </a:spcBef>
+              <a:spcAft>
+                <a:spcPts val="0"/>
+              </a:spcAft>
+              <a:buNone/>
+            </a:pPr>
+            <a:r>
+              <a:rPr lang="de-DE"/>
+              <a:t>2.Teil duzen</a:t>
             </a:r>
           </a:p>
           <a:p>
@@ -767,7 +801,54 @@
           <a:p>
             <a:r>
               <a:rPr lang="de-DE"/>
-              <a:t>Valentin</a:t>
+              <a:t>Jana Bild, Andre dazu reden </a:t>
+            </a:r>
+          </a:p>
+          <a:p>
+            <a:endParaRPr lang="de-DE"/>
+          </a:p>
+          <a:p>
+            <a:r>
+              <a:rPr lang="de-DE"/>
+              <a:t>(ausdehnen! </a:t>
+            </a:r>
+            <a:r>
+              <a:rPr lang="de-DE">
+                <a:sym typeface="Wingdings" panose="05000000000000000000" pitchFamily="2" charset="2"/>
+              </a:rPr>
+              <a:t>) </a:t>
+            </a:r>
+            <a:br>
+              <a:rPr lang="de-DE">
+                <a:sym typeface="Wingdings" panose="05000000000000000000" pitchFamily="2" charset="2"/>
+              </a:rPr>
+            </a:br>
+            <a:r>
+              <a:rPr lang="de-DE">
+                <a:sym typeface="Wingdings" panose="05000000000000000000" pitchFamily="2" charset="2"/>
+              </a:rPr>
+              <a:t>Demo + light Erklärung + zeigen, dass verschiedene Produktrecommendations auftauchen</a:t>
+            </a:r>
+          </a:p>
+          <a:p>
+            <a:r>
+              <a:rPr lang="de-DE">
+                <a:sym typeface="Wingdings" panose="05000000000000000000" pitchFamily="2" charset="2"/>
+              </a:rPr>
+              <a:t>Funktionsweise aufgreifen</a:t>
+            </a:r>
+          </a:p>
+          <a:p>
+            <a:endParaRPr lang="de-DE">
+              <a:sym typeface="Wingdings" panose="05000000000000000000" pitchFamily="2" charset="2"/>
+            </a:endParaRPr>
+          </a:p>
+          <a:p>
+            <a:r>
+              <a:rPr lang="de-DE">
+                <a:sym typeface="Wingdings" panose="05000000000000000000" pitchFamily="2" charset="2"/>
+              </a:rPr>
+              <a:t>+ Abschließende Worte</a:t>
             </a:r>
             <a:endParaRPr lang="en-DE"/>
           </a:p>
@@ -799,7 +880,7 @@
     </p:spTree>
     <p:extLst>
       <p:ext uri="{BB962C8B-B14F-4D97-AF65-F5344CB8AC3E}">
-        <p14:creationId xmlns:p14="http://schemas.microsoft.com/office/powerpoint/2010/main" val="3681840169"/>
+        <p14:creationId xmlns:p14="http://schemas.microsoft.com/office/powerpoint/2010/main" val="3560136776"/>
       </p:ext>
     </p:extLst>
   </p:cSld>
@@ -887,7 +968,7 @@
     </p:spTree>
     <p:extLst>
       <p:ext uri="{BB962C8B-B14F-4D97-AF65-F5344CB8AC3E}">
-        <p14:creationId xmlns:p14="http://schemas.microsoft.com/office/powerpoint/2010/main" val="2230860464"/>
+        <p14:creationId xmlns:p14="http://schemas.microsoft.com/office/powerpoint/2010/main" val="3681840169"/>
       </p:ext>
     </p:extLst>
   </p:cSld>
@@ -916,13 +997,19 @@
       </p:grpSpPr>
       <p:sp>
         <p:nvSpPr>
-          <p:cNvPr id="2" name="Notes Placeholder 1">
-            <a:extLst>
-              <a:ext uri="{FF2B5EF4-FFF2-40B4-BE49-F238E27FC236}">
-                <a16:creationId xmlns:a16="http://schemas.microsoft.com/office/drawing/2014/main" id="{35C6A5CB-B8C5-4005-B40B-5B31D7F28ED6}"/>
-              </a:ext>
-            </a:extLst>
-          </p:cNvPr>
+          <p:cNvPr id="2" name="Slide Image Placeholder 1"/>
+          <p:cNvSpPr>
+            <a:spLocks noGrp="1" noRot="1" noChangeAspect="1"/>
+          </p:cNvSpPr>
+          <p:nvPr>
+            <p:ph type="sldImg"/>
+          </p:nvPr>
+        </p:nvSpPr>
+        <p:spPr/>
+      </p:sp>
+      <p:sp>
+        <p:nvSpPr>
+          <p:cNvPr id="3" name="Notes Placeholder 2"/>
           <p:cNvSpPr>
             <a:spLocks noGrp="1"/>
           </p:cNvSpPr>
@@ -937,13 +1024,41 @@
           <a:p>
             <a:r>
               <a:rPr lang="de-DE"/>
-              <a:t>Jana </a:t>
+              <a:t>Valentin</a:t>
             </a:r>
             <a:endParaRPr lang="en-DE"/>
           </a:p>
         </p:txBody>
       </p:sp>
+      <p:sp>
+        <p:nvSpPr>
+          <p:cNvPr id="4" name="Slide Number Placeholder 3"/>
+          <p:cNvSpPr>
+            <a:spLocks noGrp="1"/>
+          </p:cNvSpPr>
+          <p:nvPr>
+            <p:ph type="sldNum" sz="quarter" idx="5"/>
+          </p:nvPr>
+        </p:nvSpPr>
+        <p:spPr/>
+        <p:txBody>
+          <a:bodyPr/>
+          <a:lstStyle/>
+          <a:p>
+            <a:fld id="{D9E8CA95-5B62-45AF-95E6-3D47B8C862DE}" type="slidenum">
+              <a:rPr lang="en-US" smtClean="0"/>
+              <a:t>16</a:t>
+            </a:fld>
+            <a:endParaRPr lang="en-US"/>
+          </a:p>
+        </p:txBody>
+      </p:sp>
     </p:spTree>
+    <p:extLst>
+      <p:ext uri="{BB962C8B-B14F-4D97-AF65-F5344CB8AC3E}">
+        <p14:creationId xmlns:p14="http://schemas.microsoft.com/office/powerpoint/2010/main" val="2230860464"/>
+      </p:ext>
+    </p:extLst>
   </p:cSld>
   <p:clrMapOvr>
     <a:masterClrMapping/>
@@ -1026,6 +1141,59 @@
                 <a:cs typeface="Times New Roman"/>
               </a:rPr>
               <a:t>(Product &amp; Sprint Backlog)</a:t>
+            </a:r>
+          </a:p>
+          <a:p>
+            <a:pPr marL="0" marR="0" lvl="0" indent="0" algn="l" defTabSz="914400" rtl="0" eaLnBrk="1" fontAlgn="auto" latinLnBrk="0" hangingPunct="1">
+              <a:lnSpc>
+                <a:spcPct val="100000"/>
+              </a:lnSpc>
+              <a:spcBef>
+                <a:spcPts val="0"/>
+              </a:spcBef>
+              <a:spcAft>
+                <a:spcPts val="0"/>
+              </a:spcAft>
+              <a:buClrTx/>
+              <a:buSzTx/>
+              <a:buFontTx/>
+              <a:buNone/>
+              <a:tabLst/>
+              <a:defRPr/>
+            </a:pPr>
+            <a:endParaRPr lang="en-GB" sz="1200">
+              <a:effectLst/>
+              <a:latin typeface="Calibri"/>
+              <a:ea typeface="Calibri" panose="020F0502020204030204" pitchFamily="34" charset="0"/>
+              <a:cs typeface="Times New Roman"/>
+            </a:endParaRPr>
+          </a:p>
+          <a:p>
+            <a:pPr marL="0" marR="0" lvl="0" indent="0" algn="l" defTabSz="914400" rtl="0" eaLnBrk="1" fontAlgn="auto" latinLnBrk="0" hangingPunct="1">
+              <a:lnSpc>
+                <a:spcPct val="100000"/>
+              </a:lnSpc>
+              <a:spcBef>
+                <a:spcPts val="0"/>
+              </a:spcBef>
+              <a:spcAft>
+                <a:spcPts val="0"/>
+              </a:spcAft>
+              <a:buClrTx/>
+              <a:buSzTx/>
+              <a:buFontTx/>
+              <a:buNone/>
+              <a:tabLst/>
+              <a:defRPr/>
+            </a:pPr>
+            <a:r>
+              <a:rPr lang="en-GB" sz="1200">
+                <a:effectLst/>
+                <a:latin typeface="Calibri"/>
+                <a:ea typeface="Calibri" panose="020F0502020204030204" pitchFamily="34" charset="0"/>
+                <a:cs typeface="Times New Roman"/>
+              </a:rPr>
+              <a:t>Kanban deutsch aussprechen! Mit backlock usw.</a:t>
             </a:r>
           </a:p>
           <a:p>
@@ -1522,17 +1690,6 @@
             </a:pPr>
             <a:endParaRPr lang="de-DE"/>
           </a:p>
-          <a:p>
-            <a:pPr marL="0" indent="0">
-              <a:buFontTx/>
-              <a:buNone/>
-            </a:pPr>
-            <a:r>
-              <a:rPr lang="de-DE"/>
-              <a:t>Datensatz ist relativ divers, aber hauptsächlich hellere/ europäisch/westlich Personen, andere Ethnien unterrepräsentiert (v.a. dunkelhäutig)</a:t>
-            </a:r>
-            <a:endParaRPr lang="en-DE"/>
-          </a:p>
         </p:txBody>
       </p:sp>
       <p:sp>
@@ -1619,6 +1776,35 @@
               <a:rPr lang="de-DE"/>
               <a:t>Caro</a:t>
             </a:r>
+          </a:p>
+          <a:p>
+            <a:endParaRPr lang="de-DE"/>
+          </a:p>
+          <a:p>
+            <a:pPr marL="0" marR="0" lvl="0" indent="0" algn="l" defTabSz="914400" rtl="0" eaLnBrk="1" fontAlgn="auto" latinLnBrk="0" hangingPunct="1">
+              <a:lnSpc>
+                <a:spcPct val="100000"/>
+              </a:lnSpc>
+              <a:spcBef>
+                <a:spcPts val="0"/>
+              </a:spcBef>
+              <a:spcAft>
+                <a:spcPts val="0"/>
+              </a:spcAft>
+              <a:buClrTx/>
+              <a:buSzTx/>
+              <a:buFontTx/>
+              <a:buNone/>
+              <a:tabLst/>
+              <a:defRPr/>
+            </a:pPr>
+            <a:r>
+              <a:rPr lang="de-DE"/>
+              <a:t>Note am Ende: Datensatz ist relativ divers, aber hauptsächlich hellere/ europäisch/westlich Personen, andere Ethnien unterrepräsentiert (v.a. dunkelhäutig)</a:t>
+            </a:r>
+            <a:endParaRPr lang="en-DE"/>
+          </a:p>
+          <a:p>
             <a:endParaRPr lang="en-DE"/>
           </a:p>
         </p:txBody>
@@ -2829,282 +3015,6 @@
 </p:notes>
 </file>
 
-<file path=ppt/notesSlides/notesSlide31.xml><?xml version="1.0" encoding="utf-8"?>
-<p:notes xmlns:a="http://schemas.openxmlformats.org/drawingml/2006/main" xmlns:r="http://schemas.openxmlformats.org/officeDocument/2006/relationships" xmlns:p="http://schemas.openxmlformats.org/presentationml/2006/main">
-  <p:cSld>
-    <p:spTree>
-      <p:nvGrpSpPr>
-        <p:cNvPr id="1" name=""/>
-        <p:cNvGrpSpPr/>
-        <p:nvPr/>
-      </p:nvGrpSpPr>
-      <p:grpSpPr>
-        <a:xfrm>
-          <a:off x="0" y="0"/>
-          <a:ext cx="0" cy="0"/>
-          <a:chOff x="0" y="0"/>
-          <a:chExt cx="0" cy="0"/>
-        </a:xfrm>
-      </p:grpSpPr>
-      <p:sp>
-        <p:nvSpPr>
-          <p:cNvPr id="2" name="Slide Image Placeholder 1"/>
-          <p:cNvSpPr>
-            <a:spLocks noGrp="1" noRot="1" noChangeAspect="1"/>
-          </p:cNvSpPr>
-          <p:nvPr>
-            <p:ph type="sldImg"/>
-          </p:nvPr>
-        </p:nvSpPr>
-        <p:spPr/>
-      </p:sp>
-      <p:sp>
-        <p:nvSpPr>
-          <p:cNvPr id="3" name="Notes Placeholder 2"/>
-          <p:cNvSpPr>
-            <a:spLocks noGrp="1"/>
-          </p:cNvSpPr>
-          <p:nvPr>
-            <p:ph type="body" idx="1"/>
-          </p:nvPr>
-        </p:nvSpPr>
-        <p:spPr/>
-        <p:txBody>
-          <a:bodyPr/>
-          <a:lstStyle/>
-          <a:p>
-            <a:r>
-              <a:rPr lang="de-DE"/>
-              <a:t>Andre</a:t>
-            </a:r>
-            <a:endParaRPr lang="en-DE"/>
-          </a:p>
-        </p:txBody>
-      </p:sp>
-      <p:sp>
-        <p:nvSpPr>
-          <p:cNvPr id="4" name="Slide Number Placeholder 3"/>
-          <p:cNvSpPr>
-            <a:spLocks noGrp="1"/>
-          </p:cNvSpPr>
-          <p:nvPr>
-            <p:ph type="sldNum" sz="quarter" idx="5"/>
-          </p:nvPr>
-        </p:nvSpPr>
-        <p:spPr/>
-        <p:txBody>
-          <a:bodyPr/>
-          <a:lstStyle/>
-          <a:p>
-            <a:fld id="{D9E8CA95-5B62-45AF-95E6-3D47B8C862DE}" type="slidenum">
-              <a:rPr lang="en-US" smtClean="0"/>
-              <a:t>36</a:t>
-            </a:fld>
-            <a:endParaRPr lang="en-US"/>
-          </a:p>
-        </p:txBody>
-      </p:sp>
-    </p:spTree>
-    <p:extLst>
-      <p:ext uri="{BB962C8B-B14F-4D97-AF65-F5344CB8AC3E}">
-        <p14:creationId xmlns:p14="http://schemas.microsoft.com/office/powerpoint/2010/main" val="3002464985"/>
-      </p:ext>
-    </p:extLst>
-  </p:cSld>
-  <p:clrMapOvr>
-    <a:masterClrMapping/>
-  </p:clrMapOvr>
-</p:notes>
-</file>
-
-<file path=ppt/notesSlides/notesSlide32.xml><?xml version="1.0" encoding="utf-8"?>
-<p:notes xmlns:a="http://schemas.openxmlformats.org/drawingml/2006/main" xmlns:r="http://schemas.openxmlformats.org/officeDocument/2006/relationships" xmlns:p="http://schemas.openxmlformats.org/presentationml/2006/main">
-  <p:cSld>
-    <p:spTree>
-      <p:nvGrpSpPr>
-        <p:cNvPr id="1" name=""/>
-        <p:cNvGrpSpPr/>
-        <p:nvPr/>
-      </p:nvGrpSpPr>
-      <p:grpSpPr>
-        <a:xfrm>
-          <a:off x="0" y="0"/>
-          <a:ext cx="0" cy="0"/>
-          <a:chOff x="0" y="0"/>
-          <a:chExt cx="0" cy="0"/>
-        </a:xfrm>
-      </p:grpSpPr>
-      <p:sp>
-        <p:nvSpPr>
-          <p:cNvPr id="2" name="Slide Image Placeholder 1"/>
-          <p:cNvSpPr>
-            <a:spLocks noGrp="1" noRot="1" noChangeAspect="1"/>
-          </p:cNvSpPr>
-          <p:nvPr>
-            <p:ph type="sldImg"/>
-          </p:nvPr>
-        </p:nvSpPr>
-        <p:spPr/>
-      </p:sp>
-      <p:sp>
-        <p:nvSpPr>
-          <p:cNvPr id="3" name="Notes Placeholder 2"/>
-          <p:cNvSpPr>
-            <a:spLocks noGrp="1"/>
-          </p:cNvSpPr>
-          <p:nvPr>
-            <p:ph type="body" idx="1"/>
-          </p:nvPr>
-        </p:nvSpPr>
-        <p:spPr/>
-        <p:txBody>
-          <a:bodyPr/>
-          <a:lstStyle/>
-          <a:p>
-            <a:r>
-              <a:rPr lang="de-DE"/>
-              <a:t>Auszüge! Kanban board </a:t>
-            </a:r>
-            <a:endParaRPr lang="en-DE"/>
-          </a:p>
-        </p:txBody>
-      </p:sp>
-      <p:sp>
-        <p:nvSpPr>
-          <p:cNvPr id="4" name="Slide Number Placeholder 3"/>
-          <p:cNvSpPr>
-            <a:spLocks noGrp="1"/>
-          </p:cNvSpPr>
-          <p:nvPr>
-            <p:ph type="sldNum" sz="quarter" idx="5"/>
-          </p:nvPr>
-        </p:nvSpPr>
-        <p:spPr/>
-        <p:txBody>
-          <a:bodyPr/>
-          <a:lstStyle/>
-          <a:p>
-            <a:fld id="{63365379-8475-4733-A0A3-9B5BF670FE36}" type="slidenum">
-              <a:rPr lang="en-DE" smtClean="0"/>
-              <a:t>37</a:t>
-            </a:fld>
-            <a:endParaRPr lang="en-DE"/>
-          </a:p>
-        </p:txBody>
-      </p:sp>
-    </p:spTree>
-    <p:extLst>
-      <p:ext uri="{BB962C8B-B14F-4D97-AF65-F5344CB8AC3E}">
-        <p14:creationId xmlns:p14="http://schemas.microsoft.com/office/powerpoint/2010/main" val="2629026995"/>
-      </p:ext>
-    </p:extLst>
-  </p:cSld>
-  <p:clrMapOvr>
-    <a:masterClrMapping/>
-  </p:clrMapOvr>
-</p:notes>
-</file>
-
-<file path=ppt/notesSlides/notesSlide33.xml><?xml version="1.0" encoding="utf-8"?>
-<p:notes xmlns:a="http://schemas.openxmlformats.org/drawingml/2006/main" xmlns:r="http://schemas.openxmlformats.org/officeDocument/2006/relationships" xmlns:p="http://schemas.openxmlformats.org/presentationml/2006/main">
-  <p:cSld>
-    <p:spTree>
-      <p:nvGrpSpPr>
-        <p:cNvPr id="1" name=""/>
-        <p:cNvGrpSpPr/>
-        <p:nvPr/>
-      </p:nvGrpSpPr>
-      <p:grpSpPr>
-        <a:xfrm>
-          <a:off x="0" y="0"/>
-          <a:ext cx="0" cy="0"/>
-          <a:chOff x="0" y="0"/>
-          <a:chExt cx="0" cy="0"/>
-        </a:xfrm>
-      </p:grpSpPr>
-      <p:sp>
-        <p:nvSpPr>
-          <p:cNvPr id="2" name="Slide Image Placeholder 1"/>
-          <p:cNvSpPr>
-            <a:spLocks noGrp="1" noRot="1" noChangeAspect="1"/>
-          </p:cNvSpPr>
-          <p:nvPr>
-            <p:ph type="sldImg"/>
-          </p:nvPr>
-        </p:nvSpPr>
-        <p:spPr/>
-      </p:sp>
-      <p:sp>
-        <p:nvSpPr>
-          <p:cNvPr id="3" name="Notes Placeholder 2"/>
-          <p:cNvSpPr>
-            <a:spLocks noGrp="1"/>
-          </p:cNvSpPr>
-          <p:nvPr>
-            <p:ph type="body" idx="1"/>
-          </p:nvPr>
-        </p:nvSpPr>
-        <p:spPr/>
-        <p:txBody>
-          <a:bodyPr/>
-          <a:lstStyle/>
-          <a:p>
-            <a:r>
-              <a:rPr lang="de-DE"/>
-              <a:t>Crowfoodnotation</a:t>
-            </a:r>
-          </a:p>
-          <a:p>
-            <a:r>
-              <a:rPr lang="de-DE"/>
-              <a:t>Querstrich: 1</a:t>
-            </a:r>
-          </a:p>
-          <a:p>
-            <a:r>
-              <a:rPr lang="de-DE"/>
-              <a:t>Dreieck: Many</a:t>
-            </a:r>
-            <a:endParaRPr lang="en-DE"/>
-          </a:p>
-        </p:txBody>
-      </p:sp>
-      <p:sp>
-        <p:nvSpPr>
-          <p:cNvPr id="4" name="Slide Number Placeholder 3"/>
-          <p:cNvSpPr>
-            <a:spLocks noGrp="1"/>
-          </p:cNvSpPr>
-          <p:nvPr>
-            <p:ph type="sldNum" sz="quarter" idx="5"/>
-          </p:nvPr>
-        </p:nvSpPr>
-        <p:spPr/>
-        <p:txBody>
-          <a:bodyPr/>
-          <a:lstStyle/>
-          <a:p>
-            <a:fld id="{FED3F327-ED05-47CA-A389-E0E37C2BFC29}" type="slidenum">
-              <a:rPr lang="en-DE" smtClean="0"/>
-              <a:t>39</a:t>
-            </a:fld>
-            <a:endParaRPr lang="en-DE"/>
-          </a:p>
-        </p:txBody>
-      </p:sp>
-    </p:spTree>
-    <p:extLst>
-      <p:ext uri="{BB962C8B-B14F-4D97-AF65-F5344CB8AC3E}">
-        <p14:creationId xmlns:p14="http://schemas.microsoft.com/office/powerpoint/2010/main" val="202040048"/>
-      </p:ext>
-    </p:extLst>
-  </p:cSld>
-  <p:clrMapOvr>
-    <a:masterClrMapping/>
-  </p:clrMapOvr>
-</p:notes>
-</file>
-
 <file path=ppt/notesSlides/notesSlide4.xml><?xml version="1.0" encoding="utf-8"?>
 <p:notes xmlns:a="http://schemas.openxmlformats.org/drawingml/2006/main" xmlns:r="http://schemas.openxmlformats.org/officeDocument/2006/relationships" xmlns:p="http://schemas.openxmlformats.org/presentationml/2006/main">
   <p:cSld>
@@ -3241,6 +3151,15 @@
               <a:rPr lang="de-DE"/>
               <a:t>Caro</a:t>
             </a:r>
+          </a:p>
+          <a:p>
+            <a:endParaRPr lang="de-DE"/>
+          </a:p>
+          <a:p>
+            <a:r>
+              <a:rPr lang="de-DE"/>
+              <a:t>!! Aus Banksicht</a:t>
+            </a:r>
             <a:endParaRPr lang="en-DE"/>
           </a:p>
         </p:txBody>
@@ -3328,6 +3247,24 @@
             <a:r>
               <a:rPr lang="de-DE"/>
               <a:t>Caro</a:t>
+            </a:r>
+          </a:p>
+          <a:p>
+            <a:endParaRPr lang="de-DE"/>
+          </a:p>
+          <a:p>
+            <a:r>
+              <a:rPr lang="de-DE"/>
+              <a:t>Auf 3 Slides aufteilen mit Stichpunkten als Antwort</a:t>
+            </a:r>
+          </a:p>
+          <a:p>
+            <a:endParaRPr lang="de-DE"/>
+          </a:p>
+          <a:p>
+            <a:r>
+              <a:rPr lang="de-DE"/>
+              <a:t>!! Aus Banksicht! </a:t>
             </a:r>
             <a:endParaRPr lang="en-DE"/>
           </a:p>
@@ -10345,14 +10282,14 @@
           <p:nvPr>
             <p:extLst>
               <p:ext uri="{D42A27DB-BD31-4B8C-83A1-F6EECF244321}">
-                <p14:modId xmlns:p14="http://schemas.microsoft.com/office/powerpoint/2010/main" val="102305999"/>
+                <p14:modId xmlns:p14="http://schemas.microsoft.com/office/powerpoint/2010/main" val="2971991000"/>
               </p:ext>
             </p:extLst>
           </p:nvPr>
         </p:nvGraphicFramePr>
         <p:xfrm>
           <a:off x="6241679" y="2510376"/>
-          <a:ext cx="4971837" cy="1950720"/>
+          <a:ext cx="4971837" cy="2255520"/>
         </p:xfrm>
         <a:graphic>
           <a:graphicData uri="http://schemas.openxmlformats.org/drawingml/2006/table">
@@ -10457,6 +10394,9 @@
                         <a:rPr lang="en-US" sz="2000"/>
                         <a:t>Weitere Vorteile / Monat </a:t>
                       </a:r>
+                    </a:p>
+                    <a:p>
+                      <a:endParaRPr lang="en-US" sz="2000"/>
                     </a:p>
                   </a:txBody>
                   <a:tcPr/>
@@ -11596,10 +11536,10 @@
       </p:grpSpPr>
       <p:sp>
         <p:nvSpPr>
-          <p:cNvPr id="6" name="Title 5">
+          <p:cNvPr id="5" name="Title 4">
             <a:extLst>
               <a:ext uri="{FF2B5EF4-FFF2-40B4-BE49-F238E27FC236}">
-                <a16:creationId xmlns:a16="http://schemas.microsoft.com/office/drawing/2014/main" id="{92535F63-EE83-4831-997F-36252702CAA9}"/>
+                <a16:creationId xmlns:a16="http://schemas.microsoft.com/office/drawing/2014/main" id="{12DAB5F1-0975-4405-A700-74BBD721D632}"/>
               </a:ext>
             </a:extLst>
           </p:cNvPr>
@@ -11607,28 +11547,30 @@
             <a:spLocks noGrp="1"/>
           </p:cNvSpPr>
           <p:nvPr>
-            <p:ph type="ctrTitle"/>
-          </p:nvPr>
-        </p:nvSpPr>
-        <p:spPr/>
-        <p:txBody>
-          <a:bodyPr/>
-          <a:lstStyle/>
-          <a:p>
-            <a:r>
-              <a:rPr lang="de-DE"/>
-              <a:t>Interne Umsetzung</a:t>
-            </a:r>
-            <a:endParaRPr lang="en-DE"/>
-          </a:p>
-        </p:txBody>
-      </p:sp>
-      <p:sp>
-        <p:nvSpPr>
-          <p:cNvPr id="7" name="Subtitle 6">
+            <p:ph type="title"/>
+          </p:nvPr>
+        </p:nvSpPr>
+        <p:spPr/>
+        <p:txBody>
+          <a:bodyPr>
+            <a:normAutofit/>
+          </a:bodyPr>
+          <a:lstStyle/>
+          <a:p>
+            <a:r>
+              <a:rPr lang="de-DE" sz="8000" b="1"/>
+              <a:t>ShireEye</a:t>
+            </a:r>
+            <a:endParaRPr lang="en-DE" sz="8000" b="1"/>
+          </a:p>
+        </p:txBody>
+      </p:sp>
+      <p:sp>
+        <p:nvSpPr>
+          <p:cNvPr id="8" name="Text Placeholder 7">
             <a:extLst>
               <a:ext uri="{FF2B5EF4-FFF2-40B4-BE49-F238E27FC236}">
-                <a16:creationId xmlns:a16="http://schemas.microsoft.com/office/drawing/2014/main" id="{99875289-CB13-4837-8FBC-86BEBFE068A9}"/>
+                <a16:creationId xmlns:a16="http://schemas.microsoft.com/office/drawing/2014/main" id="{67A7BF5B-CD65-4928-BDB6-512E9850634F}"/>
               </a:ext>
             </a:extLst>
           </p:cNvPr>
@@ -11636,24 +11578,30 @@
             <a:spLocks noGrp="1"/>
           </p:cNvSpPr>
           <p:nvPr>
-            <p:ph type="subTitle" idx="1"/>
-          </p:nvPr>
-        </p:nvSpPr>
-        <p:spPr/>
-        <p:txBody>
-          <a:bodyPr/>
-          <a:lstStyle/>
-          <a:p>
-            <a:endParaRPr lang="en-DE"/>
-          </a:p>
-        </p:txBody>
-      </p:sp>
-      <p:sp>
-        <p:nvSpPr>
-          <p:cNvPr id="4" name="Date Placeholder 3">
+            <p:ph type="body" idx="1"/>
+          </p:nvPr>
+        </p:nvSpPr>
+        <p:spPr/>
+        <p:txBody>
+          <a:bodyPr>
+            <a:normAutofit/>
+          </a:bodyPr>
+          <a:lstStyle/>
+          <a:p>
+            <a:r>
+              <a:rPr lang="de-DE" sz="2800"/>
+              <a:t>- Outlook -</a:t>
+            </a:r>
+            <a:endParaRPr lang="en-DE" sz="2800"/>
+          </a:p>
+        </p:txBody>
+      </p:sp>
+      <p:sp>
+        <p:nvSpPr>
+          <p:cNvPr id="3" name="Date Placeholder 2">
             <a:extLst>
               <a:ext uri="{FF2B5EF4-FFF2-40B4-BE49-F238E27FC236}">
-                <a16:creationId xmlns:a16="http://schemas.microsoft.com/office/drawing/2014/main" id="{4B136B6C-538D-4321-8B7A-4883F01BB719}"/>
+                <a16:creationId xmlns:a16="http://schemas.microsoft.com/office/drawing/2014/main" id="{6FECD82D-40ED-4053-9B89-2F806E63D479}"/>
               </a:ext>
             </a:extLst>
           </p:cNvPr>
@@ -11678,10 +11626,10 @@
       </p:sp>
       <p:sp>
         <p:nvSpPr>
-          <p:cNvPr id="5" name="Slide Number Placeholder 4">
+          <p:cNvPr id="4" name="Slide Number Placeholder 3">
             <a:extLst>
               <a:ext uri="{FF2B5EF4-FFF2-40B4-BE49-F238E27FC236}">
-                <a16:creationId xmlns:a16="http://schemas.microsoft.com/office/drawing/2014/main" id="{91C41152-A726-4362-AB72-6A8265E456F8}"/>
+                <a16:creationId xmlns:a16="http://schemas.microsoft.com/office/drawing/2014/main" id="{63B965FD-781A-43F9-9733-2EDF941CEE8D}"/>
               </a:ext>
             </a:extLst>
           </p:cNvPr>
@@ -11709,7 +11657,7 @@
     </p:spTree>
     <p:extLst>
       <p:ext uri="{BB962C8B-B14F-4D97-AF65-F5344CB8AC3E}">
-        <p14:creationId xmlns:p14="http://schemas.microsoft.com/office/powerpoint/2010/main" val="2756825684"/>
+        <p14:creationId xmlns:p14="http://schemas.microsoft.com/office/powerpoint/2010/main" val="460978704"/>
       </p:ext>
     </p:extLst>
   </p:cSld>
@@ -11738,10 +11686,10 @@
       </p:grpSpPr>
       <p:sp>
         <p:nvSpPr>
-          <p:cNvPr id="7" name="Title 6">
+          <p:cNvPr id="6" name="Title 5">
             <a:extLst>
               <a:ext uri="{FF2B5EF4-FFF2-40B4-BE49-F238E27FC236}">
-                <a16:creationId xmlns:a16="http://schemas.microsoft.com/office/drawing/2014/main" id="{785E359D-979D-48C5-89D2-EE2A79E7F4F9}"/>
+                <a16:creationId xmlns:a16="http://schemas.microsoft.com/office/drawing/2014/main" id="{92535F63-EE83-4831-997F-36252702CAA9}"/>
               </a:ext>
             </a:extLst>
           </p:cNvPr>
@@ -11749,7 +11697,7 @@
             <a:spLocks noGrp="1"/>
           </p:cNvSpPr>
           <p:nvPr>
-            <p:ph type="title"/>
+            <p:ph type="ctrTitle"/>
           </p:nvPr>
         </p:nvSpPr>
         <p:spPr/>
@@ -11759,7 +11707,7 @@
           <a:p>
             <a:r>
               <a:rPr lang="de-DE"/>
-              <a:t>Agenda – Interne Umsetzung</a:t>
+              <a:t>Interne Umsetzung</a:t>
             </a:r>
             <a:endParaRPr lang="en-DE"/>
           </a:p>
@@ -11767,10 +11715,10 @@
       </p:sp>
       <p:sp>
         <p:nvSpPr>
-          <p:cNvPr id="11" name="Content Placeholder 10">
+          <p:cNvPr id="7" name="Subtitle 6">
             <a:extLst>
               <a:ext uri="{FF2B5EF4-FFF2-40B4-BE49-F238E27FC236}">
-                <a16:creationId xmlns:a16="http://schemas.microsoft.com/office/drawing/2014/main" id="{3E4F0537-F1E1-4423-ACFC-426945928EFD}"/>
+                <a16:creationId xmlns:a16="http://schemas.microsoft.com/office/drawing/2014/main" id="{99875289-CB13-4837-8FBC-86BEBFE068A9}"/>
               </a:ext>
             </a:extLst>
           </p:cNvPr>
@@ -11778,95 +11726,13 @@
             <a:spLocks noGrp="1"/>
           </p:cNvSpPr>
           <p:nvPr>
-            <p:ph idx="1"/>
-          </p:nvPr>
-        </p:nvSpPr>
-        <p:spPr/>
-        <p:txBody>
-          <a:bodyPr>
-            <a:normAutofit fontScale="85000" lnSpcReduction="20000"/>
-          </a:bodyPr>
-          <a:lstStyle/>
-          <a:p>
-            <a:r>
-              <a:rPr lang="de-DE"/>
-              <a:t>Arbeitsweise </a:t>
-            </a:r>
-            <a:r>
-              <a:rPr lang="de-DE">
-                <a:sym typeface="Wingdings" panose="05000000000000000000" pitchFamily="2" charset="2"/>
-              </a:rPr>
-              <a:t> Scrum</a:t>
-            </a:r>
-          </a:p>
-          <a:p>
-            <a:r>
-              <a:rPr lang="en-GB"/>
-              <a:t>Risikoklassifizierung &amp; -analyse</a:t>
-            </a:r>
-          </a:p>
-          <a:p>
-            <a:r>
-              <a:rPr lang="en-GB"/>
-              <a:t>Datensätze</a:t>
-            </a:r>
-          </a:p>
-          <a:p>
-            <a:r>
-              <a:rPr lang="en-GB"/>
-              <a:t>Ereignis-Reaktionsmodell</a:t>
-            </a:r>
-          </a:p>
-          <a:p>
-            <a:r>
-              <a:rPr lang="en-GB"/>
-              <a:t>Use-Case-Schablone</a:t>
-            </a:r>
-          </a:p>
-          <a:p>
-            <a:r>
-              <a:rPr lang="en-GB"/>
-              <a:t>Aktivitätsdiagramm</a:t>
-            </a:r>
-          </a:p>
-          <a:p>
-            <a:r>
-              <a:rPr lang="en-GB"/>
-              <a:t>Architektur</a:t>
-            </a:r>
-          </a:p>
-          <a:p>
-            <a:r>
-              <a:rPr lang="en-GB"/>
-              <a:t>Entscheidungstabelle</a:t>
-            </a:r>
-          </a:p>
-          <a:p>
-            <a:r>
-              <a:rPr lang="en-GB"/>
-              <a:t>Algorithmenbeschreibung</a:t>
-            </a:r>
-          </a:p>
-          <a:p>
-            <a:r>
-              <a:rPr lang="en-GB"/>
-              <a:t>Tensorflow Modelle</a:t>
-            </a:r>
-          </a:p>
-          <a:p>
-            <a:r>
-              <a:rPr lang="en-GB"/>
-              <a:t>Explainable AI</a:t>
-            </a:r>
-          </a:p>
-          <a:p>
-            <a:endParaRPr lang="en-GB"/>
-          </a:p>
-          <a:p>
-            <a:endParaRPr lang="de-DE">
-              <a:sym typeface="Wingdings" panose="05000000000000000000" pitchFamily="2" charset="2"/>
-            </a:endParaRPr>
-          </a:p>
+            <p:ph type="subTitle" idx="1"/>
+          </p:nvPr>
+        </p:nvSpPr>
+        <p:spPr/>
+        <p:txBody>
+          <a:bodyPr/>
+          <a:lstStyle/>
           <a:p>
             <a:endParaRPr lang="en-DE"/>
           </a:p>
@@ -11874,10 +11740,10 @@
       </p:sp>
       <p:sp>
         <p:nvSpPr>
-          <p:cNvPr id="9" name="Date Placeholder 8">
+          <p:cNvPr id="4" name="Date Placeholder 3">
             <a:extLst>
               <a:ext uri="{FF2B5EF4-FFF2-40B4-BE49-F238E27FC236}">
-                <a16:creationId xmlns:a16="http://schemas.microsoft.com/office/drawing/2014/main" id="{70E17900-3E36-496C-BE95-CE605F62DCB6}"/>
+                <a16:creationId xmlns:a16="http://schemas.microsoft.com/office/drawing/2014/main" id="{4B136B6C-538D-4321-8B7A-4883F01BB719}"/>
               </a:ext>
             </a:extLst>
           </p:cNvPr>
@@ -11902,10 +11768,10 @@
       </p:sp>
       <p:sp>
         <p:nvSpPr>
-          <p:cNvPr id="10" name="Slide Number Placeholder 9">
+          <p:cNvPr id="5" name="Slide Number Placeholder 4">
             <a:extLst>
               <a:ext uri="{FF2B5EF4-FFF2-40B4-BE49-F238E27FC236}">
-                <a16:creationId xmlns:a16="http://schemas.microsoft.com/office/drawing/2014/main" id="{20806444-FBA9-4A29-85D5-C2D7E9AA8FBE}"/>
+                <a16:creationId xmlns:a16="http://schemas.microsoft.com/office/drawing/2014/main" id="{91C41152-A726-4362-AB72-6A8265E456F8}"/>
               </a:ext>
             </a:extLst>
           </p:cNvPr>
@@ -11933,7 +11799,7 @@
     </p:spTree>
     <p:extLst>
       <p:ext uri="{BB962C8B-B14F-4D97-AF65-F5344CB8AC3E}">
-        <p14:creationId xmlns:p14="http://schemas.microsoft.com/office/powerpoint/2010/main" val="841560677"/>
+        <p14:creationId xmlns:p14="http://schemas.microsoft.com/office/powerpoint/2010/main" val="2756825684"/>
       </p:ext>
     </p:extLst>
   </p:cSld>
@@ -11948,7 +11814,7 @@
   <p:cSld>
     <p:spTree>
       <p:nvGrpSpPr>
-        <p:cNvPr id="1" name="Shape 65"/>
+        <p:cNvPr id="1" name=""/>
         <p:cNvGrpSpPr/>
         <p:nvPr/>
       </p:nvGrpSpPr>
@@ -11962,133 +11828,204 @@
       </p:grpSpPr>
       <p:sp>
         <p:nvSpPr>
-          <p:cNvPr id="66" name="Google Shape;66;p15"/>
-          <p:cNvSpPr txBox="1">
+          <p:cNvPr id="7" name="Title 6">
+            <a:extLst>
+              <a:ext uri="{FF2B5EF4-FFF2-40B4-BE49-F238E27FC236}">
+                <a16:creationId xmlns:a16="http://schemas.microsoft.com/office/drawing/2014/main" id="{785E359D-979D-48C5-89D2-EE2A79E7F4F9}"/>
+              </a:ext>
+            </a:extLst>
+          </p:cNvPr>
+          <p:cNvSpPr>
             <a:spLocks noGrp="1"/>
           </p:cNvSpPr>
           <p:nvPr>
             <p:ph type="title"/>
           </p:nvPr>
         </p:nvSpPr>
-        <p:spPr>
-          <a:prstGeom prst="rect">
-            <a:avLst/>
-          </a:prstGeom>
-        </p:spPr>
-        <p:txBody>
-          <a:bodyPr spcFirstLastPara="1" vert="horz" wrap="square" lIns="121900" tIns="121900" rIns="121900" bIns="121900" rtlCol="0" anchor="ctr" anchorCtr="0">
-            <a:normAutofit/>
+        <p:spPr/>
+        <p:txBody>
+          <a:bodyPr/>
+          <a:lstStyle/>
+          <a:p>
+            <a:r>
+              <a:rPr lang="de-DE"/>
+              <a:t>Agenda – Interne Umsetzung</a:t>
+            </a:r>
+            <a:endParaRPr lang="en-DE"/>
+          </a:p>
+        </p:txBody>
+      </p:sp>
+      <p:sp>
+        <p:nvSpPr>
+          <p:cNvPr id="11" name="Content Placeholder 10">
+            <a:extLst>
+              <a:ext uri="{FF2B5EF4-FFF2-40B4-BE49-F238E27FC236}">
+                <a16:creationId xmlns:a16="http://schemas.microsoft.com/office/drawing/2014/main" id="{3E4F0537-F1E1-4423-ACFC-426945928EFD}"/>
+              </a:ext>
+            </a:extLst>
+          </p:cNvPr>
+          <p:cNvSpPr>
+            <a:spLocks noGrp="1"/>
+          </p:cNvSpPr>
+          <p:nvPr>
+            <p:ph idx="1"/>
+          </p:nvPr>
+        </p:nvSpPr>
+        <p:spPr/>
+        <p:txBody>
+          <a:bodyPr>
+            <a:normAutofit fontScale="85000" lnSpcReduction="20000"/>
           </a:bodyPr>
           <a:lstStyle/>
           <a:p>
             <a:r>
-              <a:rPr lang="en-GB"/>
+              <a:rPr lang="de-DE"/>
               <a:t>Arbeitsweise </a:t>
             </a:r>
             <a:r>
-              <a:rPr lang="en-GB">
+              <a:rPr lang="de-DE">
                 <a:sym typeface="Wingdings" panose="05000000000000000000" pitchFamily="2" charset="2"/>
               </a:rPr>
               <a:t>– Scrum</a:t>
             </a:r>
+          </a:p>
+          <a:p>
             <a:r>
               <a:rPr lang="en-GB"/>
-              <a:t> </a:t>
-            </a:r>
-            <a:endParaRPr/>
-          </a:p>
-        </p:txBody>
-      </p:sp>
-      <p:sp>
-        <p:nvSpPr>
-          <p:cNvPr id="67" name="Google Shape;67;p15"/>
-          <p:cNvSpPr txBox="1">
-            <a:spLocks noGrp="1"/>
-          </p:cNvSpPr>
-          <p:nvPr>
-            <p:ph idx="1"/>
-          </p:nvPr>
-        </p:nvSpPr>
-        <p:spPr>
-          <a:prstGeom prst="rect">
-            <a:avLst/>
-          </a:prstGeom>
-        </p:spPr>
-        <p:txBody>
-          <a:bodyPr spcFirstLastPara="1" vert="horz" wrap="square" lIns="121900" tIns="121900" rIns="121900" bIns="121900" rtlCol="0" anchor="t" anchorCtr="0">
-            <a:normAutofit/>
-          </a:bodyPr>
-          <a:lstStyle/>
-          <a:p>
-            <a:pPr marL="0" indent="0">
-              <a:buNone/>
-            </a:pPr>
-            <a:r>
-              <a:rPr lang="en-GB" b="1"/>
-              <a:t>Scrum</a:t>
-            </a:r>
-            <a:endParaRPr b="1"/>
-          </a:p>
-          <a:p>
-            <a:pPr>
-              <a:spcBef>
-                <a:spcPts val="1600"/>
-              </a:spcBef>
-              <a:buFont typeface="Arial" panose="020B0604020202020204" pitchFamily="34" charset="0"/>
-              <a:buChar char="•"/>
-            </a:pPr>
-            <a:r>
-              <a:rPr lang="en-GB" sz="2400"/>
-              <a:t>Scrum Master: Jana</a:t>
-            </a:r>
-            <a:endParaRPr sz="2400"/>
-          </a:p>
-          <a:p>
-            <a:pPr>
-              <a:buFont typeface="Arial" panose="020B0604020202020204" pitchFamily="34" charset="0"/>
-              <a:buChar char="•"/>
-            </a:pPr>
-            <a:r>
-              <a:rPr lang="en-GB" sz="2400"/>
-              <a:t>Product Owner: Valentin</a:t>
-            </a:r>
-            <a:endParaRPr sz="2400"/>
-          </a:p>
-          <a:p>
-            <a:pPr>
-              <a:buFont typeface="Arial" panose="020B0604020202020204" pitchFamily="34" charset="0"/>
-              <a:buChar char="•"/>
-            </a:pPr>
-            <a:r>
-              <a:rPr lang="en-GB" sz="2400"/>
-              <a:t>Sales: Caro</a:t>
-            </a:r>
-            <a:endParaRPr sz="2400"/>
-          </a:p>
-          <a:p>
-            <a:pPr>
-              <a:buFont typeface="Arial" panose="020B0604020202020204" pitchFamily="34" charset="0"/>
-              <a:buChar char="•"/>
-            </a:pPr>
-            <a:r>
-              <a:rPr lang="en-GB" sz="2400"/>
-              <a:t>Developers: Valentin, André, Jana, Caro</a:t>
-            </a:r>
-            <a:endParaRPr sz="2400"/>
-          </a:p>
-          <a:p>
-            <a:pPr>
-              <a:buFont typeface="Arial" panose="020B0604020202020204" pitchFamily="34" charset="0"/>
-              <a:buChar char="•"/>
-            </a:pPr>
-            <a:r>
-              <a:rPr lang="en-GB" sz="2400"/>
-              <a:t>Architect: André</a:t>
-            </a:r>
+              <a:t>Risikoklassifizierung &amp; -analyse</a:t>
+            </a:r>
+          </a:p>
+          <a:p>
+            <a:r>
+              <a:rPr lang="en-GB"/>
+              <a:t>Datensätze</a:t>
+            </a:r>
+          </a:p>
+          <a:p>
+            <a:r>
+              <a:rPr lang="en-GB"/>
+              <a:t>Ereignis-Reaktionsmodell</a:t>
+            </a:r>
+          </a:p>
+          <a:p>
+            <a:r>
+              <a:rPr lang="en-GB"/>
+              <a:t>Use-Case-Schablone</a:t>
+            </a:r>
+          </a:p>
+          <a:p>
+            <a:r>
+              <a:rPr lang="en-GB"/>
+              <a:t>Aktivitätsdiagramm</a:t>
+            </a:r>
+          </a:p>
+          <a:p>
+            <a:r>
+              <a:rPr lang="en-GB"/>
+              <a:t>Architektur</a:t>
+            </a:r>
+          </a:p>
+          <a:p>
+            <a:r>
+              <a:rPr lang="en-GB"/>
+              <a:t>Entscheidungstabelle</a:t>
+            </a:r>
+          </a:p>
+          <a:p>
+            <a:r>
+              <a:rPr lang="en-GB"/>
+              <a:t>Algorithmenbeschreibung</a:t>
+            </a:r>
+          </a:p>
+          <a:p>
+            <a:r>
+              <a:rPr lang="en-GB"/>
+              <a:t>Tensorflow Modelle</a:t>
+            </a:r>
+          </a:p>
+          <a:p>
+            <a:r>
+              <a:rPr lang="en-GB"/>
+              <a:t>Explainable AI</a:t>
+            </a:r>
+          </a:p>
+          <a:p>
+            <a:endParaRPr lang="en-GB"/>
+          </a:p>
+          <a:p>
+            <a:endParaRPr lang="de-DE">
+              <a:sym typeface="Wingdings" panose="05000000000000000000" pitchFamily="2" charset="2"/>
+            </a:endParaRPr>
+          </a:p>
+          <a:p>
+            <a:endParaRPr lang="en-DE"/>
+          </a:p>
+        </p:txBody>
+      </p:sp>
+      <p:sp>
+        <p:nvSpPr>
+          <p:cNvPr id="9" name="Date Placeholder 8">
+            <a:extLst>
+              <a:ext uri="{FF2B5EF4-FFF2-40B4-BE49-F238E27FC236}">
+                <a16:creationId xmlns:a16="http://schemas.microsoft.com/office/drawing/2014/main" id="{70E17900-3E36-496C-BE95-CE605F62DCB6}"/>
+              </a:ext>
+            </a:extLst>
+          </p:cNvPr>
+          <p:cNvSpPr>
+            <a:spLocks noGrp="1"/>
+          </p:cNvSpPr>
+          <p:nvPr>
+            <p:ph type="dt" sz="half" idx="10"/>
+          </p:nvPr>
+        </p:nvSpPr>
+        <p:spPr/>
+        <p:txBody>
+          <a:bodyPr/>
+          <a:lstStyle/>
+          <a:p>
+            <a:r>
+              <a:rPr lang="en-DE"/>
+              <a:t>&lt;/&gt; | ShireTec</a:t>
+            </a:r>
+          </a:p>
+        </p:txBody>
+      </p:sp>
+      <p:sp>
+        <p:nvSpPr>
+          <p:cNvPr id="10" name="Slide Number Placeholder 9">
+            <a:extLst>
+              <a:ext uri="{FF2B5EF4-FFF2-40B4-BE49-F238E27FC236}">
+                <a16:creationId xmlns:a16="http://schemas.microsoft.com/office/drawing/2014/main" id="{20806444-FBA9-4A29-85D5-C2D7E9AA8FBE}"/>
+              </a:ext>
+            </a:extLst>
+          </p:cNvPr>
+          <p:cNvSpPr>
+            <a:spLocks noGrp="1"/>
+          </p:cNvSpPr>
+          <p:nvPr>
+            <p:ph type="sldNum" sz="quarter" idx="12"/>
+          </p:nvPr>
+        </p:nvSpPr>
+        <p:spPr/>
+        <p:txBody>
+          <a:bodyPr/>
+          <a:lstStyle/>
+          <a:p>
+            <a:fld id="{330EA680-D336-4FF7-8B7A-9848BB0A1C32}" type="slidenum">
+              <a:rPr lang="en-US" smtClean="0"/>
+              <a:pPr/>
+              <a:t>16</a:t>
+            </a:fld>
+            <a:endParaRPr lang="en-DE"/>
           </a:p>
         </p:txBody>
       </p:sp>
     </p:spTree>
+    <p:extLst>
+      <p:ext uri="{BB962C8B-B14F-4D97-AF65-F5344CB8AC3E}">
+        <p14:creationId xmlns:p14="http://schemas.microsoft.com/office/powerpoint/2010/main" val="841560677"/>
+      </p:ext>
+    </p:extLst>
   </p:cSld>
   <p:clrMapOvr>
     <a:masterClrMapping/>
@@ -13731,7 +13668,7 @@
           <p:nvPr>
             <p:extLst>
               <p:ext uri="{D42A27DB-BD31-4B8C-83A1-F6EECF244321}">
-                <p14:modId xmlns:p14="http://schemas.microsoft.com/office/powerpoint/2010/main" val="3615402504"/>
+                <p14:modId xmlns:p14="http://schemas.microsoft.com/office/powerpoint/2010/main" val="1672063359"/>
               </p:ext>
             </p:extLst>
           </p:nvPr>
@@ -13824,7 +13761,7 @@
                         </a:spcAft>
                         <a:buNone/>
                       </a:pPr>
-                      <a:endParaRPr lang="en-US" sz="1050">
+                      <a:endParaRPr lang="en-US" sz="1050" b="1">
                         <a:effectLst/>
                       </a:endParaRPr>
                     </a:p>
@@ -13856,7 +13793,7 @@
                         </a:spcAft>
                       </a:pPr>
                       <a:r>
-                        <a:rPr lang="en-US" sz="1200">
+                        <a:rPr lang="en-US" sz="1200" b="1">
                           <a:solidFill>
                             <a:schemeClr val="tx1"/>
                           </a:solidFill>
@@ -13865,7 +13802,7 @@
                         <a:t>Sehr </a:t>
                       </a:r>
                       <a:r>
-                        <a:rPr lang="en-US" sz="1200" err="1">
+                        <a:rPr lang="en-US" sz="1200" b="1" err="1">
                           <a:solidFill>
                             <a:schemeClr val="tx1"/>
                           </a:solidFill>
@@ -13874,7 +13811,7 @@
                         <a:t>hoch</a:t>
                       </a:r>
                       <a:r>
-                        <a:rPr lang="en-US" sz="1200">
+                        <a:rPr lang="en-US" sz="1200" b="1">
                           <a:solidFill>
                             <a:schemeClr val="tx1"/>
                           </a:solidFill>
@@ -13913,9 +13850,9 @@
                         </a:spcAft>
                       </a:pPr>
                       <a:r>
-                        <a:rPr lang="en-US" sz="1400">
+                        <a:rPr lang="en-US" sz="1400" b="1">
                           <a:solidFill>
-                            <a:schemeClr val="tx1"/>
+                            <a:schemeClr val="bg1"/>
                           </a:solidFill>
                           <a:effectLst/>
                         </a:rPr>
@@ -13960,9 +13897,9 @@
                         </a:spcAft>
                       </a:pPr>
                       <a:r>
-                        <a:rPr lang="en-US" sz="1400">
+                        <a:rPr lang="en-US" sz="1400" b="1">
                           <a:solidFill>
-                            <a:schemeClr val="tx1"/>
+                            <a:schemeClr val="bg1"/>
                           </a:solidFill>
                           <a:effectLst/>
                         </a:rPr>
@@ -14007,9 +13944,9 @@
                         </a:spcAft>
                       </a:pPr>
                       <a:r>
-                        <a:rPr lang="en-US" sz="1400">
+                        <a:rPr lang="en-US" sz="1400" b="1">
                           <a:solidFill>
-                            <a:schemeClr val="tx1"/>
+                            <a:schemeClr val="bg1"/>
                           </a:solidFill>
                           <a:effectLst/>
                         </a:rPr>
@@ -14054,7 +13991,10 @@
                         </a:spcAft>
                       </a:pPr>
                       <a:r>
-                        <a:rPr lang="en-US" sz="1400">
+                        <a:rPr lang="en-US" sz="1400" b="1">
+                          <a:solidFill>
+                            <a:schemeClr val="bg1"/>
+                          </a:solidFill>
                           <a:effectLst/>
                         </a:rPr>
                         <a:t>16</a:t>
@@ -14115,7 +14055,7 @@
                         </a:spcAft>
                       </a:pPr>
                       <a:r>
-                        <a:rPr lang="en-US" sz="1200">
+                        <a:rPr lang="en-US" sz="1200" b="1">
                           <a:solidFill>
                             <a:schemeClr val="tx1"/>
                           </a:solidFill>
@@ -14154,7 +14094,7 @@
                         </a:spcAft>
                       </a:pPr>
                       <a:r>
-                        <a:rPr lang="en-US" sz="1400">
+                        <a:rPr lang="en-US" sz="1400" b="1">
                           <a:effectLst/>
                         </a:rPr>
                         <a:t>3</a:t>
@@ -14198,7 +14138,7 @@
                         </a:spcAft>
                       </a:pPr>
                       <a:r>
-                        <a:rPr lang="en-US" sz="1400">
+                        <a:rPr lang="en-US" sz="1400" b="1">
                           <a:effectLst/>
                         </a:rPr>
                         <a:t>6</a:t>
@@ -14242,7 +14182,7 @@
                         </a:spcAft>
                       </a:pPr>
                       <a:r>
-                        <a:rPr lang="en-US" sz="1400">
+                        <a:rPr lang="en-US" sz="1400" b="1">
                           <a:effectLst/>
                         </a:rPr>
                         <a:t>9</a:t>
@@ -14286,7 +14226,7 @@
                         </a:spcAft>
                       </a:pPr>
                       <a:r>
-                        <a:rPr lang="en-US" sz="1400">
+                        <a:rPr lang="en-US" sz="1400" b="1">
                           <a:effectLst/>
                         </a:rPr>
                         <a:t>12</a:t>
@@ -14347,7 +14287,7 @@
                         </a:spcAft>
                       </a:pPr>
                       <a:r>
-                        <a:rPr lang="en-US" sz="1200">
+                        <a:rPr lang="en-US" sz="1200" b="1">
                           <a:solidFill>
                             <a:schemeClr val="tx1"/>
                           </a:solidFill>
@@ -14386,7 +14326,7 @@
                         </a:spcAft>
                       </a:pPr>
                       <a:r>
-                        <a:rPr lang="en-US" sz="1400">
+                        <a:rPr lang="en-US" sz="1400" b="1">
                           <a:effectLst/>
                         </a:rPr>
                         <a:t>2</a:t>
@@ -14430,7 +14370,7 @@
                         </a:spcAft>
                       </a:pPr>
                       <a:r>
-                        <a:rPr lang="en-US" sz="1400">
+                        <a:rPr lang="en-US" sz="1400" b="1">
                           <a:effectLst/>
                         </a:rPr>
                         <a:t>4</a:t>
@@ -14474,7 +14414,7 @@
                         </a:spcAft>
                       </a:pPr>
                       <a:r>
-                        <a:rPr lang="en-US" sz="1400">
+                        <a:rPr lang="en-US" sz="1400" b="1">
                           <a:effectLst/>
                         </a:rPr>
                         <a:t>6</a:t>
@@ -14518,7 +14458,7 @@
                         </a:spcAft>
                       </a:pPr>
                       <a:r>
-                        <a:rPr lang="en-US" sz="1400">
+                        <a:rPr lang="en-US" sz="1400" b="1">
                           <a:effectLst/>
                         </a:rPr>
                         <a:t>8</a:t>
@@ -14579,7 +14519,7 @@
                         </a:spcAft>
                       </a:pPr>
                       <a:r>
-                        <a:rPr lang="en-US" sz="1200">
+                        <a:rPr lang="en-US" sz="1200" b="1">
                           <a:solidFill>
                             <a:schemeClr val="tx1"/>
                           </a:solidFill>
@@ -14618,7 +14558,7 @@
                         </a:spcAft>
                       </a:pPr>
                       <a:r>
-                        <a:rPr lang="en-US" sz="1400">
+                        <a:rPr lang="en-US" sz="1400" b="1">
                           <a:effectLst/>
                         </a:rPr>
                         <a:t>1</a:t>
@@ -14662,7 +14602,7 @@
                         </a:spcAft>
                       </a:pPr>
                       <a:r>
-                        <a:rPr lang="en-US" sz="1400">
+                        <a:rPr lang="en-US" sz="1400" b="1">
                           <a:effectLst/>
                         </a:rPr>
                         <a:t>2</a:t>
@@ -14706,7 +14646,7 @@
                         </a:spcAft>
                       </a:pPr>
                       <a:r>
-                        <a:rPr lang="en-US" sz="1400">
+                        <a:rPr lang="en-US" sz="1400" b="1">
                           <a:effectLst/>
                         </a:rPr>
                         <a:t>3</a:t>
@@ -14750,7 +14690,7 @@
                         </a:spcAft>
                       </a:pPr>
                       <a:r>
-                        <a:rPr lang="en-US" sz="1400">
+                        <a:rPr lang="en-US" sz="1400" b="1">
                           <a:effectLst/>
                         </a:rPr>
                         <a:t>4</a:t>
@@ -14810,7 +14750,7 @@
                           <a:spcPts val="0"/>
                         </a:spcAft>
                       </a:pPr>
-                      <a:endParaRPr lang="en-US" sz="1400">
+                      <a:endParaRPr lang="en-US" sz="1400" b="1">
                         <a:solidFill>
                           <a:schemeClr val="tx1"/>
                         </a:solidFill>
@@ -14845,7 +14785,7 @@
                         </a:spcAft>
                       </a:pPr>
                       <a:r>
-                        <a:rPr lang="en-US" sz="1200">
+                        <a:rPr lang="en-US" sz="1200" b="1">
                           <a:solidFill>
                             <a:schemeClr val="tx1"/>
                           </a:solidFill>
@@ -14884,7 +14824,7 @@
                         </a:spcAft>
                       </a:pPr>
                       <a:r>
-                        <a:rPr lang="en-US" sz="1200">
+                        <a:rPr lang="en-US" sz="1200" b="1">
                           <a:solidFill>
                             <a:schemeClr val="tx1"/>
                           </a:solidFill>
@@ -14923,7 +14863,7 @@
                         </a:spcAft>
                       </a:pPr>
                       <a:r>
-                        <a:rPr lang="en-US" sz="1200">
+                        <a:rPr lang="en-US" sz="1200" b="1">
                           <a:solidFill>
                             <a:schemeClr val="tx1"/>
                           </a:solidFill>
@@ -14962,7 +14902,7 @@
                         </a:spcAft>
                       </a:pPr>
                       <a:r>
-                        <a:rPr lang="en-US" sz="1200">
+                        <a:rPr lang="en-US" sz="1200" b="1">
                           <a:solidFill>
                             <a:schemeClr val="tx1"/>
                           </a:solidFill>
@@ -15007,7 +14947,7 @@
                           <a:spcPts val="0"/>
                         </a:spcAft>
                       </a:pPr>
-                      <a:endParaRPr lang="en-US">
+                      <a:endParaRPr lang="en-US" b="1">
                         <a:effectLst/>
                       </a:endParaRPr>
                     </a:p>
@@ -16022,7 +15962,7 @@
         <p:spPr/>
         <p:txBody>
           <a:bodyPr>
-            <a:normAutofit lnSpcReduction="10000"/>
+            <a:normAutofit fontScale="92500"/>
           </a:bodyPr>
           <a:lstStyle/>
           <a:p>
@@ -16031,17 +15971,19 @@
             </a:pPr>
             <a:r>
               <a:rPr lang="en-US" b="1"/>
-              <a:t>Emotion Classification</a:t>
-            </a:r>
-          </a:p>
-          <a:p>
-            <a:r>
-              <a:rPr lang="en-US" sz="2400" err="1"/>
-              <a:t>Enthält</a:t>
-            </a:r>
+              <a:t>FER2013 Datensatz </a:t>
+            </a:r>
+          </a:p>
+          <a:p>
             <a:r>
               <a:rPr lang="en-US" sz="2400"/>
-              <a:t> ca. 30,000 </a:t>
+              <a:t>Für Emotion Classification</a:t>
+            </a:r>
+          </a:p>
+          <a:p>
+            <a:r>
+              <a:rPr lang="en-US" sz="2400"/>
+              <a:t>Enthält ca. 30.000 </a:t>
             </a:r>
             <a:r>
               <a:rPr lang="en-US" sz="2400" err="1"/>
@@ -16289,18 +16231,21 @@
               <a:buNone/>
             </a:pPr>
             <a:r>
-              <a:rPr lang="en-US" b="1"/>
-              <a:t>Age Group Classification</a:t>
-            </a:r>
-          </a:p>
-          <a:p>
-            <a:r>
-              <a:rPr lang="en-US" sz="2400" err="1"/>
-              <a:t>Enthält</a:t>
-            </a:r>
+              <a:rPr lang="en-US" sz="2800" b="1"/>
+              <a:t>Facial Age Datensatz</a:t>
+            </a:r>
+            <a:endParaRPr lang="en-US" b="1"/>
+          </a:p>
+          <a:p>
             <a:r>
               <a:rPr lang="en-US" sz="2400"/>
-              <a:t> ca. 9000 </a:t>
+              <a:t>Für Age Group Classification</a:t>
+            </a:r>
+          </a:p>
+          <a:p>
+            <a:r>
+              <a:rPr lang="en-US" sz="2400"/>
+              <a:t>Enthält ca. 9.000 </a:t>
             </a:r>
             <a:r>
               <a:rPr lang="en-US" sz="2400" err="1"/>
@@ -16339,6 +16284,12 @@
             <a:r>
               <a:rPr lang="en-US" sz="2400"/>
               <a:t>: Child (&lt;=16), Young Adult (17 - 30), Adult (31-60), Senior (&gt;60)</a:t>
+            </a:r>
+          </a:p>
+          <a:p>
+            <a:r>
+              <a:rPr lang="en-US" sz="2400"/>
+              <a:t>Datensatz:</a:t>
             </a:r>
           </a:p>
         </p:txBody>
@@ -20529,1038 +20480,6 @@
     <p:extLst>
       <p:ext uri="{BB962C8B-B14F-4D97-AF65-F5344CB8AC3E}">
         <p14:creationId xmlns:p14="http://schemas.microsoft.com/office/powerpoint/2010/main" val="3753002156"/>
-      </p:ext>
-    </p:extLst>
-  </p:cSld>
-  <p:clrMapOvr>
-    <a:masterClrMapping/>
-  </p:clrMapOvr>
-</p:sld>
-</file>
-
-<file path=ppt/slides/slide36.xml><?xml version="1.0" encoding="utf-8"?>
-<p:sld xmlns:a="http://schemas.openxmlformats.org/drawingml/2006/main" xmlns:r="http://schemas.openxmlformats.org/officeDocument/2006/relationships" xmlns:p="http://schemas.openxmlformats.org/presentationml/2006/main" show="0">
-  <p:cSld>
-    <p:spTree>
-      <p:nvGrpSpPr>
-        <p:cNvPr id="1" name=""/>
-        <p:cNvGrpSpPr/>
-        <p:nvPr/>
-      </p:nvGrpSpPr>
-      <p:grpSpPr>
-        <a:xfrm>
-          <a:off x="0" y="0"/>
-          <a:ext cx="0" cy="0"/>
-          <a:chOff x="0" y="0"/>
-          <a:chExt cx="0" cy="0"/>
-        </a:xfrm>
-      </p:grpSpPr>
-      <p:sp>
-        <p:nvSpPr>
-          <p:cNvPr id="4" name="Title 3">
-            <a:extLst>
-              <a:ext uri="{FF2B5EF4-FFF2-40B4-BE49-F238E27FC236}">
-                <a16:creationId xmlns:a16="http://schemas.microsoft.com/office/drawing/2014/main" id="{F4459FF9-3D30-4E7F-AB75-0AC386B74068}"/>
-              </a:ext>
-            </a:extLst>
-          </p:cNvPr>
-          <p:cNvSpPr>
-            <a:spLocks noGrp="1"/>
-          </p:cNvSpPr>
-          <p:nvPr>
-            <p:ph type="title"/>
-          </p:nvPr>
-        </p:nvSpPr>
-        <p:spPr/>
-        <p:txBody>
-          <a:bodyPr/>
-          <a:lstStyle/>
-          <a:p>
-            <a:r>
-              <a:rPr lang="en-DE">
-                <a:cs typeface="Calibri Light"/>
-              </a:rPr>
-              <a:t>Algorithmenbeschreibung</a:t>
-            </a:r>
-            <a:endParaRPr lang="en-DE"/>
-          </a:p>
-        </p:txBody>
-      </p:sp>
-      <p:sp>
-        <p:nvSpPr>
-          <p:cNvPr id="5" name="Text Placeholder 4">
-            <a:extLst>
-              <a:ext uri="{FF2B5EF4-FFF2-40B4-BE49-F238E27FC236}">
-                <a16:creationId xmlns:a16="http://schemas.microsoft.com/office/drawing/2014/main" id="{C48EBEDE-43F8-4D20-AE75-C0418F99D708}"/>
-              </a:ext>
-            </a:extLst>
-          </p:cNvPr>
-          <p:cNvSpPr>
-            <a:spLocks noGrp="1"/>
-          </p:cNvSpPr>
-          <p:nvPr>
-            <p:ph type="body" idx="1"/>
-          </p:nvPr>
-        </p:nvSpPr>
-        <p:spPr/>
-        <p:txBody>
-          <a:bodyPr>
-            <a:normAutofit/>
-          </a:bodyPr>
-          <a:lstStyle/>
-          <a:p>
-            <a:r>
-              <a:rPr lang="en-DE" sz="2800">
-                <a:cs typeface="Calibri"/>
-              </a:rPr>
-              <a:t>Emotion Classification</a:t>
-            </a:r>
-            <a:endParaRPr lang="en-US" sz="2800"/>
-          </a:p>
-        </p:txBody>
-      </p:sp>
-      <p:sp>
-        <p:nvSpPr>
-          <p:cNvPr id="6" name="Content Placeholder 5">
-            <a:extLst>
-              <a:ext uri="{FF2B5EF4-FFF2-40B4-BE49-F238E27FC236}">
-                <a16:creationId xmlns:a16="http://schemas.microsoft.com/office/drawing/2014/main" id="{AA99A519-B75D-4E96-BED3-B102E2636C13}"/>
-              </a:ext>
-            </a:extLst>
-          </p:cNvPr>
-          <p:cNvSpPr>
-            <a:spLocks noGrp="1"/>
-          </p:cNvSpPr>
-          <p:nvPr>
-            <p:ph sz="half" idx="2"/>
-          </p:nvPr>
-        </p:nvSpPr>
-        <p:spPr/>
-        <p:txBody>
-          <a:bodyPr vert="horz" lIns="91440" tIns="45720" rIns="91440" bIns="45720" rtlCol="0" anchor="t">
-            <a:normAutofit/>
-          </a:bodyPr>
-          <a:lstStyle/>
-          <a:p>
-            <a:r>
-              <a:rPr lang="en-DE" sz="2400">
-                <a:cs typeface="Calibri"/>
-              </a:rPr>
-              <a:t>Convolutional Neural Network</a:t>
-            </a:r>
-          </a:p>
-          <a:p>
-            <a:r>
-              <a:rPr lang="en-DE" sz="2400">
-                <a:cs typeface="Calibri"/>
-              </a:rPr>
-              <a:t>Seven Emotions</a:t>
-            </a:r>
-          </a:p>
-          <a:p>
-            <a:pPr lvl="1"/>
-            <a:r>
-              <a:rPr lang="en-DE">
-                <a:cs typeface="Calibri"/>
-              </a:rPr>
-              <a:t>Neutral, Happy, Surprised, Sad, Angry, Disgusted, Fearful</a:t>
-            </a:r>
-          </a:p>
-        </p:txBody>
-      </p:sp>
-      <p:sp>
-        <p:nvSpPr>
-          <p:cNvPr id="7" name="Text Placeholder 6">
-            <a:extLst>
-              <a:ext uri="{FF2B5EF4-FFF2-40B4-BE49-F238E27FC236}">
-                <a16:creationId xmlns:a16="http://schemas.microsoft.com/office/drawing/2014/main" id="{461079F5-F7EE-40D3-8765-58175B07D3D9}"/>
-              </a:ext>
-            </a:extLst>
-          </p:cNvPr>
-          <p:cNvSpPr>
-            <a:spLocks noGrp="1"/>
-          </p:cNvSpPr>
-          <p:nvPr>
-            <p:ph type="body" sz="quarter" idx="3"/>
-          </p:nvPr>
-        </p:nvSpPr>
-        <p:spPr/>
-        <p:txBody>
-          <a:bodyPr>
-            <a:normAutofit/>
-          </a:bodyPr>
-          <a:lstStyle/>
-          <a:p>
-            <a:r>
-              <a:rPr lang="en-DE" sz="2800">
-                <a:cs typeface="Calibri"/>
-              </a:rPr>
-              <a:t>Age Classification</a:t>
-            </a:r>
-            <a:endParaRPr lang="en-US" sz="2800"/>
-          </a:p>
-        </p:txBody>
-      </p:sp>
-      <p:sp>
-        <p:nvSpPr>
-          <p:cNvPr id="8" name="Content Placeholder 7">
-            <a:extLst>
-              <a:ext uri="{FF2B5EF4-FFF2-40B4-BE49-F238E27FC236}">
-                <a16:creationId xmlns:a16="http://schemas.microsoft.com/office/drawing/2014/main" id="{92ED28F0-BDC5-432D-8AE1-F4E36574741C}"/>
-              </a:ext>
-            </a:extLst>
-          </p:cNvPr>
-          <p:cNvSpPr>
-            <a:spLocks noGrp="1"/>
-          </p:cNvSpPr>
-          <p:nvPr>
-            <p:ph sz="quarter" idx="4"/>
-          </p:nvPr>
-        </p:nvSpPr>
-        <p:spPr/>
-        <p:txBody>
-          <a:bodyPr vert="horz" lIns="91440" tIns="45720" rIns="91440" bIns="45720" rtlCol="0" anchor="t">
-            <a:normAutofit/>
-          </a:bodyPr>
-          <a:lstStyle/>
-          <a:p>
-            <a:r>
-              <a:rPr lang="en-DE" sz="2400">
-                <a:cs typeface="Calibri"/>
-              </a:rPr>
-              <a:t>Convolutional Neural Network</a:t>
-            </a:r>
-          </a:p>
-          <a:p>
-            <a:r>
-              <a:rPr lang="en-DE" sz="2400">
-                <a:cs typeface="Calibri"/>
-              </a:rPr>
-              <a:t>Four Age Groups:</a:t>
-            </a:r>
-          </a:p>
-          <a:p>
-            <a:pPr lvl="1"/>
-            <a:r>
-              <a:rPr lang="en-DE">
-                <a:cs typeface="Calibri"/>
-              </a:rPr>
-              <a:t>Child, Young Adult, Adult, Senior</a:t>
-            </a:r>
-          </a:p>
-        </p:txBody>
-      </p:sp>
-      <p:pic>
-        <p:nvPicPr>
-          <p:cNvPr id="2" name="Picture 2" descr="Chart, histogram&#10;&#10;Description automatically generated">
-            <a:extLst>
-              <a:ext uri="{FF2B5EF4-FFF2-40B4-BE49-F238E27FC236}">
-                <a16:creationId xmlns:a16="http://schemas.microsoft.com/office/drawing/2014/main" id="{9F3A7C3F-D5BE-428F-887C-DDCAE12E3539}"/>
-              </a:ext>
-            </a:extLst>
-          </p:cNvPr>
-          <p:cNvPicPr>
-            <a:picLocks noChangeAspect="1"/>
-          </p:cNvPicPr>
-          <p:nvPr/>
-        </p:nvPicPr>
-        <p:blipFill>
-          <a:blip r:embed="rId3"/>
-          <a:stretch>
-            <a:fillRect/>
-          </a:stretch>
-        </p:blipFill>
-        <p:spPr>
-          <a:xfrm>
-            <a:off x="5999584" y="4345655"/>
-            <a:ext cx="5350587" cy="2069996"/>
-          </a:xfrm>
-          <a:prstGeom prst="rect">
-            <a:avLst/>
-          </a:prstGeom>
-        </p:spPr>
-      </p:pic>
-      <p:pic>
-        <p:nvPicPr>
-          <p:cNvPr id="3" name="Picture 8" descr="Chart&#10;&#10;Description automatically generated">
-            <a:extLst>
-              <a:ext uri="{FF2B5EF4-FFF2-40B4-BE49-F238E27FC236}">
-                <a16:creationId xmlns:a16="http://schemas.microsoft.com/office/drawing/2014/main" id="{98F24FED-E296-4E29-9E4C-F06BAF6358F2}"/>
-              </a:ext>
-            </a:extLst>
-          </p:cNvPr>
-          <p:cNvPicPr>
-            <a:picLocks noChangeAspect="1"/>
-          </p:cNvPicPr>
-          <p:nvPr/>
-        </p:nvPicPr>
-        <p:blipFill>
-          <a:blip r:embed="rId4"/>
-          <a:stretch>
-            <a:fillRect/>
-          </a:stretch>
-        </p:blipFill>
-        <p:spPr>
-          <a:xfrm>
-            <a:off x="639666" y="4345655"/>
-            <a:ext cx="5355771" cy="2069996"/>
-          </a:xfrm>
-          <a:prstGeom prst="rect">
-            <a:avLst/>
-          </a:prstGeom>
-        </p:spPr>
-      </p:pic>
-      <p:sp>
-        <p:nvSpPr>
-          <p:cNvPr id="14" name="Date Placeholder 13">
-            <a:extLst>
-              <a:ext uri="{FF2B5EF4-FFF2-40B4-BE49-F238E27FC236}">
-                <a16:creationId xmlns:a16="http://schemas.microsoft.com/office/drawing/2014/main" id="{4EC8AFB0-3BD2-48D0-8062-8C99218B9019}"/>
-              </a:ext>
-            </a:extLst>
-          </p:cNvPr>
-          <p:cNvSpPr>
-            <a:spLocks noGrp="1"/>
-          </p:cNvSpPr>
-          <p:nvPr>
-            <p:ph type="dt" sz="half" idx="10"/>
-          </p:nvPr>
-        </p:nvSpPr>
-        <p:spPr/>
-        <p:txBody>
-          <a:bodyPr/>
-          <a:lstStyle/>
-          <a:p>
-            <a:r>
-              <a:rPr lang="en-DE"/>
-              <a:t>&lt;/&gt; | ShireTec</a:t>
-            </a:r>
-          </a:p>
-        </p:txBody>
-      </p:sp>
-      <p:sp>
-        <p:nvSpPr>
-          <p:cNvPr id="15" name="Slide Number Placeholder 14">
-            <a:extLst>
-              <a:ext uri="{FF2B5EF4-FFF2-40B4-BE49-F238E27FC236}">
-                <a16:creationId xmlns:a16="http://schemas.microsoft.com/office/drawing/2014/main" id="{A05BA8E0-4AA1-4C0E-A428-B211F05A5F10}"/>
-              </a:ext>
-            </a:extLst>
-          </p:cNvPr>
-          <p:cNvSpPr>
-            <a:spLocks noGrp="1"/>
-          </p:cNvSpPr>
-          <p:nvPr>
-            <p:ph type="sldNum" sz="quarter" idx="12"/>
-          </p:nvPr>
-        </p:nvSpPr>
-        <p:spPr/>
-        <p:txBody>
-          <a:bodyPr/>
-          <a:lstStyle/>
-          <a:p>
-            <a:fld id="{330EA680-D336-4FF7-8B7A-9848BB0A1C32}" type="slidenum">
-              <a:rPr lang="en-US" smtClean="0"/>
-              <a:pPr/>
-              <a:t>36</a:t>
-            </a:fld>
-            <a:endParaRPr lang="en-DE"/>
-          </a:p>
-        </p:txBody>
-      </p:sp>
-    </p:spTree>
-    <p:extLst>
-      <p:ext uri="{BB962C8B-B14F-4D97-AF65-F5344CB8AC3E}">
-        <p14:creationId xmlns:p14="http://schemas.microsoft.com/office/powerpoint/2010/main" val="3563593852"/>
-      </p:ext>
-    </p:extLst>
-  </p:cSld>
-  <p:clrMapOvr>
-    <a:masterClrMapping/>
-  </p:clrMapOvr>
-</p:sld>
-</file>
-
-<file path=ppt/slides/slide37.xml><?xml version="1.0" encoding="utf-8"?>
-<p:sld xmlns:a="http://schemas.openxmlformats.org/drawingml/2006/main" xmlns:r="http://schemas.openxmlformats.org/officeDocument/2006/relationships" xmlns:p="http://schemas.openxmlformats.org/presentationml/2006/main" show="0">
-  <p:cSld>
-    <p:spTree>
-      <p:nvGrpSpPr>
-        <p:cNvPr id="1" name=""/>
-        <p:cNvGrpSpPr/>
-        <p:nvPr/>
-      </p:nvGrpSpPr>
-      <p:grpSpPr>
-        <a:xfrm>
-          <a:off x="0" y="0"/>
-          <a:ext cx="0" cy="0"/>
-          <a:chOff x="0" y="0"/>
-          <a:chExt cx="0" cy="0"/>
-        </a:xfrm>
-      </p:grpSpPr>
-      <p:sp>
-        <p:nvSpPr>
-          <p:cNvPr id="2" name="Title 1">
-            <a:extLst>
-              <a:ext uri="{FF2B5EF4-FFF2-40B4-BE49-F238E27FC236}">
-                <a16:creationId xmlns:a16="http://schemas.microsoft.com/office/drawing/2014/main" id="{A171F704-027A-4E83-A1A7-427150384F7A}"/>
-              </a:ext>
-            </a:extLst>
-          </p:cNvPr>
-          <p:cNvSpPr>
-            <a:spLocks noGrp="1"/>
-          </p:cNvSpPr>
-          <p:nvPr>
-            <p:ph type="title"/>
-          </p:nvPr>
-        </p:nvSpPr>
-        <p:spPr/>
-        <p:txBody>
-          <a:bodyPr/>
-          <a:lstStyle/>
-          <a:p>
-            <a:r>
-              <a:rPr lang="de-DE"/>
-              <a:t>Notion</a:t>
-            </a:r>
-            <a:endParaRPr lang="en-DE"/>
-          </a:p>
-        </p:txBody>
-      </p:sp>
-      <p:pic>
-        <p:nvPicPr>
-          <p:cNvPr id="7" name="Content Placeholder 6">
-            <a:extLst>
-              <a:ext uri="{FF2B5EF4-FFF2-40B4-BE49-F238E27FC236}">
-                <a16:creationId xmlns:a16="http://schemas.microsoft.com/office/drawing/2014/main" id="{2D7E5938-8FCA-49FA-AAB1-71F5997C55ED}"/>
-              </a:ext>
-            </a:extLst>
-          </p:cNvPr>
-          <p:cNvPicPr>
-            <a:picLocks noGrp="1" noChangeAspect="1"/>
-          </p:cNvPicPr>
-          <p:nvPr>
-            <p:ph sz="half" idx="1"/>
-          </p:nvPr>
-        </p:nvPicPr>
-        <p:blipFill>
-          <a:blip r:embed="rId3"/>
-          <a:stretch>
-            <a:fillRect/>
-          </a:stretch>
-        </p:blipFill>
-        <p:spPr>
-          <a:xfrm>
-            <a:off x="1017968" y="1825625"/>
-            <a:ext cx="4822063" cy="4351338"/>
-          </a:xfrm>
-        </p:spPr>
-      </p:pic>
-      <p:pic>
-        <p:nvPicPr>
-          <p:cNvPr id="8" name="Content Placeholder 17">
-            <a:extLst>
-              <a:ext uri="{FF2B5EF4-FFF2-40B4-BE49-F238E27FC236}">
-                <a16:creationId xmlns:a16="http://schemas.microsoft.com/office/drawing/2014/main" id="{FBDF42AC-3E19-4870-BAFF-B47A36A4F9C1}"/>
-              </a:ext>
-            </a:extLst>
-          </p:cNvPr>
-          <p:cNvPicPr>
-            <a:picLocks noGrp="1" noChangeAspect="1"/>
-          </p:cNvPicPr>
-          <p:nvPr>
-            <p:ph sz="half" idx="2"/>
-          </p:nvPr>
-        </p:nvPicPr>
-        <p:blipFill rotWithShape="1">
-          <a:blip r:embed="rId4"/>
-          <a:srcRect r="29744"/>
-          <a:stretch/>
-        </p:blipFill>
-        <p:spPr>
-          <a:xfrm>
-            <a:off x="6492161" y="1825625"/>
-            <a:ext cx="4541677" cy="4351338"/>
-          </a:xfrm>
-        </p:spPr>
-      </p:pic>
-      <p:sp>
-        <p:nvSpPr>
-          <p:cNvPr id="10" name="Date Placeholder 9">
-            <a:extLst>
-              <a:ext uri="{FF2B5EF4-FFF2-40B4-BE49-F238E27FC236}">
-                <a16:creationId xmlns:a16="http://schemas.microsoft.com/office/drawing/2014/main" id="{07CCA1B4-D131-4A3C-AD49-A1AE56972C4C}"/>
-              </a:ext>
-            </a:extLst>
-          </p:cNvPr>
-          <p:cNvSpPr>
-            <a:spLocks noGrp="1"/>
-          </p:cNvSpPr>
-          <p:nvPr>
-            <p:ph type="dt" sz="half" idx="10"/>
-          </p:nvPr>
-        </p:nvSpPr>
-        <p:spPr/>
-        <p:txBody>
-          <a:bodyPr/>
-          <a:lstStyle/>
-          <a:p>
-            <a:r>
-              <a:rPr lang="en-DE"/>
-              <a:t>&lt;/&gt; | ShireTec</a:t>
-            </a:r>
-            <a:endParaRPr lang="en-US"/>
-          </a:p>
-        </p:txBody>
-      </p:sp>
-      <p:sp>
-        <p:nvSpPr>
-          <p:cNvPr id="11" name="Slide Number Placeholder 10">
-            <a:extLst>
-              <a:ext uri="{FF2B5EF4-FFF2-40B4-BE49-F238E27FC236}">
-                <a16:creationId xmlns:a16="http://schemas.microsoft.com/office/drawing/2014/main" id="{C03D1DA3-C0F9-4C16-9780-0B038A1606A7}"/>
-              </a:ext>
-            </a:extLst>
-          </p:cNvPr>
-          <p:cNvSpPr>
-            <a:spLocks noGrp="1"/>
-          </p:cNvSpPr>
-          <p:nvPr>
-            <p:ph type="sldNum" sz="quarter" idx="12"/>
-          </p:nvPr>
-        </p:nvSpPr>
-        <p:spPr/>
-        <p:txBody>
-          <a:bodyPr/>
-          <a:lstStyle/>
-          <a:p>
-            <a:fld id="{330EA680-D336-4FF7-8B7A-9848BB0A1C32}" type="slidenum">
-              <a:rPr lang="en-US" smtClean="0"/>
-              <a:t>37</a:t>
-            </a:fld>
-            <a:endParaRPr lang="en-US"/>
-          </a:p>
-        </p:txBody>
-      </p:sp>
-    </p:spTree>
-    <p:extLst>
-      <p:ext uri="{BB962C8B-B14F-4D97-AF65-F5344CB8AC3E}">
-        <p14:creationId xmlns:p14="http://schemas.microsoft.com/office/powerpoint/2010/main" val="3695293189"/>
-      </p:ext>
-    </p:extLst>
-  </p:cSld>
-  <p:clrMapOvr>
-    <a:masterClrMapping/>
-  </p:clrMapOvr>
-</p:sld>
-</file>
-
-<file path=ppt/slides/slide38.xml><?xml version="1.0" encoding="utf-8"?>
-<p:sld xmlns:a="http://schemas.openxmlformats.org/drawingml/2006/main" xmlns:r="http://schemas.openxmlformats.org/officeDocument/2006/relationships" xmlns:p="http://schemas.openxmlformats.org/presentationml/2006/main" show="0">
-  <p:cSld>
-    <p:spTree>
-      <p:nvGrpSpPr>
-        <p:cNvPr id="1" name=""/>
-        <p:cNvGrpSpPr/>
-        <p:nvPr/>
-      </p:nvGrpSpPr>
-      <p:grpSpPr>
-        <a:xfrm>
-          <a:off x="0" y="0"/>
-          <a:ext cx="0" cy="0"/>
-          <a:chOff x="0" y="0"/>
-          <a:chExt cx="0" cy="0"/>
-        </a:xfrm>
-      </p:grpSpPr>
-      <p:sp>
-        <p:nvSpPr>
-          <p:cNvPr id="2" name="Title 1">
-            <a:extLst>
-              <a:ext uri="{FF2B5EF4-FFF2-40B4-BE49-F238E27FC236}">
-                <a16:creationId xmlns:a16="http://schemas.microsoft.com/office/drawing/2014/main" id="{CC3CA8EA-7225-4434-8B62-9BCD4B1D629C}"/>
-              </a:ext>
-            </a:extLst>
-          </p:cNvPr>
-          <p:cNvSpPr>
-            <a:spLocks noGrp="1"/>
-          </p:cNvSpPr>
-          <p:nvPr>
-            <p:ph type="title"/>
-          </p:nvPr>
-        </p:nvSpPr>
-        <p:spPr/>
-        <p:txBody>
-          <a:bodyPr/>
-          <a:lstStyle/>
-          <a:p>
-            <a:r>
-              <a:rPr lang="en-US"/>
-              <a:t>Data</a:t>
-            </a:r>
-            <a:endParaRPr lang="en-DE"/>
-          </a:p>
-        </p:txBody>
-      </p:sp>
-      <p:sp>
-        <p:nvSpPr>
-          <p:cNvPr id="8" name="Text Placeholder 7">
-            <a:extLst>
-              <a:ext uri="{FF2B5EF4-FFF2-40B4-BE49-F238E27FC236}">
-                <a16:creationId xmlns:a16="http://schemas.microsoft.com/office/drawing/2014/main" id="{C6F418D5-F01B-49FD-9A92-1FE2B5B1D0D5}"/>
-              </a:ext>
-            </a:extLst>
-          </p:cNvPr>
-          <p:cNvSpPr>
-            <a:spLocks noGrp="1"/>
-          </p:cNvSpPr>
-          <p:nvPr>
-            <p:ph type="body" idx="1"/>
-          </p:nvPr>
-        </p:nvSpPr>
-        <p:spPr/>
-        <p:txBody>
-          <a:bodyPr/>
-          <a:lstStyle/>
-          <a:p>
-            <a:r>
-              <a:rPr lang="en-US"/>
-              <a:t>Emotion Classifier</a:t>
-            </a:r>
-            <a:endParaRPr lang="en-DE"/>
-          </a:p>
-        </p:txBody>
-      </p:sp>
-      <p:sp>
-        <p:nvSpPr>
-          <p:cNvPr id="9" name="Content Placeholder 8">
-            <a:extLst>
-              <a:ext uri="{FF2B5EF4-FFF2-40B4-BE49-F238E27FC236}">
-                <a16:creationId xmlns:a16="http://schemas.microsoft.com/office/drawing/2014/main" id="{7B950B13-A4FA-447B-82CD-E4879AFCF457}"/>
-              </a:ext>
-            </a:extLst>
-          </p:cNvPr>
-          <p:cNvSpPr>
-            <a:spLocks noGrp="1"/>
-          </p:cNvSpPr>
-          <p:nvPr>
-            <p:ph sz="half" idx="2"/>
-          </p:nvPr>
-        </p:nvSpPr>
-        <p:spPr/>
-        <p:txBody>
-          <a:bodyPr vert="horz" lIns="91440" tIns="45720" rIns="91440" bIns="45720" rtlCol="0" anchor="t">
-            <a:normAutofit/>
-          </a:bodyPr>
-          <a:lstStyle/>
-          <a:p>
-            <a:r>
-              <a:rPr lang="en-US" sz="1800" err="1"/>
-              <a:t>graue</a:t>
-            </a:r>
-            <a:r>
-              <a:rPr lang="en-US" sz="1800"/>
-              <a:t> </a:t>
-            </a:r>
-            <a:r>
-              <a:rPr lang="en-US" sz="1800" err="1"/>
-              <a:t>Bilder</a:t>
-            </a:r>
-            <a:r>
-              <a:rPr lang="en-US" sz="1800"/>
-              <a:t> (48 x 48)</a:t>
-            </a:r>
-          </a:p>
-          <a:p>
-            <a:r>
-              <a:rPr lang="en-US" sz="1800" err="1"/>
-              <a:t>Emotionen</a:t>
-            </a:r>
-            <a:r>
-              <a:rPr lang="en-US" sz="1800"/>
-              <a:t> (</a:t>
-            </a:r>
-            <a:r>
-              <a:rPr lang="en-DE" sz="1800">
-                <a:cs typeface="Calibri"/>
-              </a:rPr>
-              <a:t>Neutral, Happy, Surprised, Sad, Angry, Disgusted, Fearful</a:t>
-            </a:r>
-            <a:r>
-              <a:rPr lang="en-US" sz="1800"/>
-              <a:t>)</a:t>
-            </a:r>
-          </a:p>
-        </p:txBody>
-      </p:sp>
-      <p:sp>
-        <p:nvSpPr>
-          <p:cNvPr id="10" name="Text Placeholder 9">
-            <a:extLst>
-              <a:ext uri="{FF2B5EF4-FFF2-40B4-BE49-F238E27FC236}">
-                <a16:creationId xmlns:a16="http://schemas.microsoft.com/office/drawing/2014/main" id="{8AD5BC38-9BE9-4242-B6EA-5647468FDE12}"/>
-              </a:ext>
-            </a:extLst>
-          </p:cNvPr>
-          <p:cNvSpPr>
-            <a:spLocks noGrp="1"/>
-          </p:cNvSpPr>
-          <p:nvPr>
-            <p:ph type="body" sz="quarter" idx="3"/>
-          </p:nvPr>
-        </p:nvSpPr>
-        <p:spPr/>
-        <p:txBody>
-          <a:bodyPr/>
-          <a:lstStyle/>
-          <a:p>
-            <a:r>
-              <a:rPr lang="en-US"/>
-              <a:t>Age Classifier</a:t>
-            </a:r>
-            <a:endParaRPr lang="en-DE"/>
-          </a:p>
-        </p:txBody>
-      </p:sp>
-      <p:sp>
-        <p:nvSpPr>
-          <p:cNvPr id="11" name="Content Placeholder 10">
-            <a:extLst>
-              <a:ext uri="{FF2B5EF4-FFF2-40B4-BE49-F238E27FC236}">
-                <a16:creationId xmlns:a16="http://schemas.microsoft.com/office/drawing/2014/main" id="{CF40AB24-6F74-40EA-9EB2-24C12AD78B68}"/>
-              </a:ext>
-            </a:extLst>
-          </p:cNvPr>
-          <p:cNvSpPr>
-            <a:spLocks noGrp="1"/>
-          </p:cNvSpPr>
-          <p:nvPr>
-            <p:ph sz="quarter" idx="4"/>
-          </p:nvPr>
-        </p:nvSpPr>
-        <p:spPr/>
-        <p:txBody>
-          <a:bodyPr/>
-          <a:lstStyle/>
-          <a:p>
-            <a:r>
-              <a:rPr lang="en-US" sz="1800" err="1"/>
-              <a:t>farbige</a:t>
-            </a:r>
-            <a:r>
-              <a:rPr lang="en-US" sz="1800"/>
-              <a:t> </a:t>
-            </a:r>
-            <a:r>
-              <a:rPr lang="en-US" sz="1800" err="1"/>
-              <a:t>Bilder</a:t>
-            </a:r>
-            <a:r>
-              <a:rPr lang="en-US" sz="1800"/>
-              <a:t> (200 x 200)</a:t>
-            </a:r>
-          </a:p>
-          <a:p>
-            <a:r>
-              <a:rPr lang="en-US" sz="1800" err="1"/>
-              <a:t>nach</a:t>
-            </a:r>
-            <a:r>
-              <a:rPr lang="en-US" sz="1800"/>
-              <a:t> Alter </a:t>
-            </a:r>
-            <a:r>
-              <a:rPr lang="en-US" sz="1800" err="1"/>
-              <a:t>sortiert</a:t>
-            </a:r>
-            <a:endParaRPr lang="en-DE" sz="1800"/>
-          </a:p>
-          <a:p>
-            <a:endParaRPr lang="en-US" sz="1800"/>
-          </a:p>
-          <a:p>
-            <a:endParaRPr lang="en-US"/>
-          </a:p>
-          <a:p>
-            <a:endParaRPr lang="en-DE"/>
-          </a:p>
-        </p:txBody>
-      </p:sp>
-      <p:pic>
-        <p:nvPicPr>
-          <p:cNvPr id="4" name="Picture 3">
-            <a:extLst>
-              <a:ext uri="{FF2B5EF4-FFF2-40B4-BE49-F238E27FC236}">
-                <a16:creationId xmlns:a16="http://schemas.microsoft.com/office/drawing/2014/main" id="{663018F3-E0CD-4ADF-A294-89443DD9B4B8}"/>
-              </a:ext>
-            </a:extLst>
-          </p:cNvPr>
-          <p:cNvPicPr>
-            <a:picLocks noChangeAspect="1"/>
-          </p:cNvPicPr>
-          <p:nvPr/>
-        </p:nvPicPr>
-        <p:blipFill>
-          <a:blip r:embed="rId2"/>
-          <a:stretch>
-            <a:fillRect/>
-          </a:stretch>
-        </p:blipFill>
-        <p:spPr>
-          <a:xfrm>
-            <a:off x="1425770" y="3502672"/>
-            <a:ext cx="4156591" cy="3035455"/>
-          </a:xfrm>
-          <a:prstGeom prst="rect">
-            <a:avLst/>
-          </a:prstGeom>
-        </p:spPr>
-      </p:pic>
-      <p:pic>
-        <p:nvPicPr>
-          <p:cNvPr id="7" name="Picture 6">
-            <a:extLst>
-              <a:ext uri="{FF2B5EF4-FFF2-40B4-BE49-F238E27FC236}">
-                <a16:creationId xmlns:a16="http://schemas.microsoft.com/office/drawing/2014/main" id="{035D6FE2-9EE0-4127-8DB9-4FAB86FF1C66}"/>
-              </a:ext>
-            </a:extLst>
-          </p:cNvPr>
-          <p:cNvPicPr>
-            <a:picLocks noChangeAspect="1"/>
-          </p:cNvPicPr>
-          <p:nvPr/>
-        </p:nvPicPr>
-        <p:blipFill>
-          <a:blip r:embed="rId3"/>
-          <a:stretch>
-            <a:fillRect/>
-          </a:stretch>
-        </p:blipFill>
-        <p:spPr>
-          <a:xfrm>
-            <a:off x="6609641" y="3502672"/>
-            <a:ext cx="4156591" cy="3035456"/>
-          </a:xfrm>
-          <a:prstGeom prst="rect">
-            <a:avLst/>
-          </a:prstGeom>
-        </p:spPr>
-      </p:pic>
-      <p:sp>
-        <p:nvSpPr>
-          <p:cNvPr id="14" name="Date Placeholder 13">
-            <a:extLst>
-              <a:ext uri="{FF2B5EF4-FFF2-40B4-BE49-F238E27FC236}">
-                <a16:creationId xmlns:a16="http://schemas.microsoft.com/office/drawing/2014/main" id="{DAB4C9F7-9B05-4045-8220-F21C10C7ADFB}"/>
-              </a:ext>
-            </a:extLst>
-          </p:cNvPr>
-          <p:cNvSpPr>
-            <a:spLocks noGrp="1"/>
-          </p:cNvSpPr>
-          <p:nvPr>
-            <p:ph type="dt" sz="half" idx="10"/>
-          </p:nvPr>
-        </p:nvSpPr>
-        <p:spPr/>
-        <p:txBody>
-          <a:bodyPr/>
-          <a:lstStyle/>
-          <a:p>
-            <a:r>
-              <a:rPr lang="en-DE"/>
-              <a:t>&lt;/&gt; | ShireTec</a:t>
-            </a:r>
-          </a:p>
-        </p:txBody>
-      </p:sp>
-      <p:sp>
-        <p:nvSpPr>
-          <p:cNvPr id="15" name="Slide Number Placeholder 14">
-            <a:extLst>
-              <a:ext uri="{FF2B5EF4-FFF2-40B4-BE49-F238E27FC236}">
-                <a16:creationId xmlns:a16="http://schemas.microsoft.com/office/drawing/2014/main" id="{FF56BBC3-82D9-4CCE-82DC-D11330494050}"/>
-              </a:ext>
-            </a:extLst>
-          </p:cNvPr>
-          <p:cNvSpPr>
-            <a:spLocks noGrp="1"/>
-          </p:cNvSpPr>
-          <p:nvPr>
-            <p:ph type="sldNum" sz="quarter" idx="12"/>
-          </p:nvPr>
-        </p:nvSpPr>
-        <p:spPr/>
-        <p:txBody>
-          <a:bodyPr/>
-          <a:lstStyle/>
-          <a:p>
-            <a:fld id="{330EA680-D336-4FF7-8B7A-9848BB0A1C32}" type="slidenum">
-              <a:rPr lang="en-US" smtClean="0"/>
-              <a:pPr/>
-              <a:t>38</a:t>
-            </a:fld>
-            <a:endParaRPr lang="en-DE"/>
-          </a:p>
-        </p:txBody>
-      </p:sp>
-    </p:spTree>
-    <p:extLst>
-      <p:ext uri="{BB962C8B-B14F-4D97-AF65-F5344CB8AC3E}">
-        <p14:creationId xmlns:p14="http://schemas.microsoft.com/office/powerpoint/2010/main" val="255411098"/>
-      </p:ext>
-    </p:extLst>
-  </p:cSld>
-  <p:clrMapOvr>
-    <a:masterClrMapping/>
-  </p:clrMapOvr>
-</p:sld>
-</file>
-
-<file path=ppt/slides/slide39.xml><?xml version="1.0" encoding="utf-8"?>
-<p:sld xmlns:a="http://schemas.openxmlformats.org/drawingml/2006/main" xmlns:r="http://schemas.openxmlformats.org/officeDocument/2006/relationships" xmlns:p="http://schemas.openxmlformats.org/presentationml/2006/main" show="0">
-  <p:cSld>
-    <p:spTree>
-      <p:nvGrpSpPr>
-        <p:cNvPr id="1" name=""/>
-        <p:cNvGrpSpPr/>
-        <p:nvPr/>
-      </p:nvGrpSpPr>
-      <p:grpSpPr>
-        <a:xfrm>
-          <a:off x="0" y="0"/>
-          <a:ext cx="0" cy="0"/>
-          <a:chOff x="0" y="0"/>
-          <a:chExt cx="0" cy="0"/>
-        </a:xfrm>
-      </p:grpSpPr>
-      <p:sp>
-        <p:nvSpPr>
-          <p:cNvPr id="2" name="Title 1">
-            <a:extLst>
-              <a:ext uri="{FF2B5EF4-FFF2-40B4-BE49-F238E27FC236}">
-                <a16:creationId xmlns:a16="http://schemas.microsoft.com/office/drawing/2014/main" id="{9C973EF5-D680-4121-9A49-9C702D445867}"/>
-              </a:ext>
-            </a:extLst>
-          </p:cNvPr>
-          <p:cNvSpPr>
-            <a:spLocks noGrp="1"/>
-          </p:cNvSpPr>
-          <p:nvPr>
-            <p:ph type="title"/>
-          </p:nvPr>
-        </p:nvSpPr>
-        <p:spPr/>
-        <p:txBody>
-          <a:bodyPr/>
-          <a:lstStyle/>
-          <a:p>
-            <a:r>
-              <a:rPr lang="en-US">
-                <a:cs typeface="Calibri Light"/>
-              </a:rPr>
-              <a:t>ERM-</a:t>
-            </a:r>
-            <a:r>
-              <a:rPr lang="en-US" err="1">
-                <a:cs typeface="Calibri Light"/>
-              </a:rPr>
-              <a:t>Diagramm</a:t>
-            </a:r>
-            <a:endParaRPr lang="en-US" err="1"/>
-          </a:p>
-        </p:txBody>
-      </p:sp>
-      <p:pic>
-        <p:nvPicPr>
-          <p:cNvPr id="4" name="Picture 4" descr="Diagram&#10;&#10;Description automatically generated">
-            <a:extLst>
-              <a:ext uri="{FF2B5EF4-FFF2-40B4-BE49-F238E27FC236}">
-                <a16:creationId xmlns:a16="http://schemas.microsoft.com/office/drawing/2014/main" id="{93355760-65FA-4A4F-BB4B-55F1FA01BF45}"/>
-              </a:ext>
-            </a:extLst>
-          </p:cNvPr>
-          <p:cNvPicPr>
-            <a:picLocks noGrp="1" noChangeAspect="1"/>
-          </p:cNvPicPr>
-          <p:nvPr>
-            <p:ph idx="1"/>
-          </p:nvPr>
-        </p:nvPicPr>
-        <p:blipFill>
-          <a:blip r:embed="rId3"/>
-          <a:stretch>
-            <a:fillRect/>
-          </a:stretch>
-        </p:blipFill>
-        <p:spPr>
-          <a:xfrm>
-            <a:off x="1543765" y="1825625"/>
-            <a:ext cx="9104469" cy="4351338"/>
-          </a:xfrm>
-        </p:spPr>
-      </p:pic>
-      <p:sp>
-        <p:nvSpPr>
-          <p:cNvPr id="9" name="Date Placeholder 8">
-            <a:extLst>
-              <a:ext uri="{FF2B5EF4-FFF2-40B4-BE49-F238E27FC236}">
-                <a16:creationId xmlns:a16="http://schemas.microsoft.com/office/drawing/2014/main" id="{E1C4F54B-87FD-44CA-BE99-DEE667D8DAB9}"/>
-              </a:ext>
-            </a:extLst>
-          </p:cNvPr>
-          <p:cNvSpPr>
-            <a:spLocks noGrp="1"/>
-          </p:cNvSpPr>
-          <p:nvPr>
-            <p:ph type="dt" sz="half" idx="10"/>
-          </p:nvPr>
-        </p:nvSpPr>
-        <p:spPr/>
-        <p:txBody>
-          <a:bodyPr/>
-          <a:lstStyle/>
-          <a:p>
-            <a:r>
-              <a:rPr lang="en-DE"/>
-              <a:t>&lt;/&gt; | ShireTec</a:t>
-            </a:r>
-          </a:p>
-        </p:txBody>
-      </p:sp>
-      <p:sp>
-        <p:nvSpPr>
-          <p:cNvPr id="10" name="Slide Number Placeholder 9">
-            <a:extLst>
-              <a:ext uri="{FF2B5EF4-FFF2-40B4-BE49-F238E27FC236}">
-                <a16:creationId xmlns:a16="http://schemas.microsoft.com/office/drawing/2014/main" id="{3D40B0AC-41F0-42B3-8931-F54FE862FFBD}"/>
-              </a:ext>
-            </a:extLst>
-          </p:cNvPr>
-          <p:cNvSpPr>
-            <a:spLocks noGrp="1"/>
-          </p:cNvSpPr>
-          <p:nvPr>
-            <p:ph type="sldNum" sz="quarter" idx="12"/>
-          </p:nvPr>
-        </p:nvSpPr>
-        <p:spPr/>
-        <p:txBody>
-          <a:bodyPr/>
-          <a:lstStyle/>
-          <a:p>
-            <a:fld id="{330EA680-D336-4FF7-8B7A-9848BB0A1C32}" type="slidenum">
-              <a:rPr lang="en-US" smtClean="0"/>
-              <a:pPr/>
-              <a:t>39</a:t>
-            </a:fld>
-            <a:endParaRPr lang="en-DE"/>
-          </a:p>
-        </p:txBody>
-      </p:sp>
-    </p:spTree>
-    <p:extLst>
-      <p:ext uri="{BB962C8B-B14F-4D97-AF65-F5344CB8AC3E}">
-        <p14:creationId xmlns:p14="http://schemas.microsoft.com/office/powerpoint/2010/main" val="2400745198"/>
       </p:ext>
     </p:extLst>
   </p:cSld>

</xml_diff>